<commit_message>
Aaron 10/15/2023 1: TR2
</commit_message>
<xml_diff>
--- a/Trainings/TR2/Lecture.pptx
+++ b/Trainings/TR2/Lecture.pptx
@@ -5,10 +5,10 @@
     <p:sldMasterId id="2147483648" r:id="rId1"/>
   </p:sldMasterIdLst>
   <p:notesMasterIdLst>
-    <p:notesMasterId r:id="rId13"/>
+    <p:notesMasterId r:id="rId31"/>
   </p:notesMasterIdLst>
   <p:handoutMasterIdLst>
-    <p:handoutMasterId r:id="rId14"/>
+    <p:handoutMasterId r:id="rId32"/>
   </p:handoutMasterIdLst>
   <p:sldIdLst>
     <p:sldId id="256" r:id="rId3"/>
@@ -21,6 +21,24 @@
     <p:sldId id="266" r:id="rId10"/>
     <p:sldId id="267" r:id="rId11"/>
     <p:sldId id="268" r:id="rId12"/>
+    <p:sldId id="269" r:id="rId13"/>
+    <p:sldId id="270" r:id="rId14"/>
+    <p:sldId id="272" r:id="rId15"/>
+    <p:sldId id="273" r:id="rId16"/>
+    <p:sldId id="277" r:id="rId17"/>
+    <p:sldId id="274" r:id="rId18"/>
+    <p:sldId id="275" r:id="rId19"/>
+    <p:sldId id="276" r:id="rId20"/>
+    <p:sldId id="278" r:id="rId21"/>
+    <p:sldId id="291" r:id="rId22"/>
+    <p:sldId id="279" r:id="rId23"/>
+    <p:sldId id="281" r:id="rId24"/>
+    <p:sldId id="282" r:id="rId25"/>
+    <p:sldId id="287" r:id="rId26"/>
+    <p:sldId id="290" r:id="rId27"/>
+    <p:sldId id="283" r:id="rId28"/>
+    <p:sldId id="289" r:id="rId29"/>
+    <p:sldId id="288" r:id="rId30"/>
   </p:sldIdLst>
   <p:sldSz cx="12192000" cy="6858000"/>
   <p:notesSz cx="7103745" cy="10234295"/>
@@ -2019,7 +2037,7 @@
               <a:t>Training </a:t>
             </a:r>
             <a:r>
-              <a:rPr lang="" altLang="en-US" sz="4800">
+              <a:rPr lang="en-US" altLang="en-US" sz="4800">
                 <a:solidFill>
                   <a:srgbClr val="7CE0D1"/>
                 </a:solidFill>
@@ -2066,10 +2084,10 @@
           <a:bodyPr/>
           <a:p>
             <a:r>
-              <a:rPr lang="" altLang="en-US"/>
+              <a:rPr lang="en-US" altLang="en-US"/>
               <a:t>Aaron Rabinowitz, Vaishnavi Karanam</a:t>
             </a:r>
-            <a:endParaRPr lang="" altLang="en-US"/>
+            <a:endParaRPr lang="en-US" altLang="en-US"/>
           </a:p>
         </p:txBody>
       </p:sp>
@@ -2106,7 +2124,7 @@
           <a:bodyPr/>
           <a:p>
             <a:r>
-              <a:rPr lang="" altLang="en-US"/>
+              <a:rPr lang="en-US" altLang="en-US"/>
               <a:t>Taxonomy - </a:t>
             </a:r>
             <a:r>
@@ -2116,54 +2134,9 @@
                 </a:solidFill>
                 <a:sym typeface="+mn-ea"/>
               </a:rPr>
-              <a:t>Value</a:t>
-            </a:r>
-            <a:r>
-              <a:rPr lang="" altLang="en-US">
-                <a:solidFill>
-                  <a:srgbClr val="FD0062"/>
-                </a:solidFill>
-                <a:sym typeface="+mn-ea"/>
-              </a:rPr>
-              <a:t>s</a:t>
-            </a:r>
-            <a:r>
-              <a:rPr lang="en-US" altLang="en-US">
-                <a:solidFill>
-                  <a:srgbClr val="FD0062"/>
-                </a:solidFill>
-                <a:sym typeface="+mn-ea"/>
-              </a:rPr>
-              <a:t> vs. </a:t>
-            </a:r>
-            <a:r>
-              <a:rPr lang="" altLang="en-US">
-                <a:solidFill>
-                  <a:srgbClr val="FD0062"/>
-                </a:solidFill>
-                <a:sym typeface="+mn-ea"/>
-              </a:rPr>
-              <a:t>P</a:t>
-            </a:r>
-            <a:r>
-              <a:rPr lang="en-US" altLang="en-US">
-                <a:solidFill>
-                  <a:srgbClr val="FD0062"/>
-                </a:solidFill>
-                <a:sym typeface="+mn-ea"/>
-              </a:rPr>
-              <a:t>ointer</a:t>
-            </a:r>
-            <a:r>
-              <a:rPr lang="" altLang="en-US">
-                <a:solidFill>
-                  <a:srgbClr val="FD0062"/>
-                </a:solidFill>
-                <a:sym typeface="+mn-ea"/>
-              </a:rPr>
-              <a:t>s</a:t>
-            </a:r>
-            <a:endParaRPr lang="" altLang="en-US">
+              <a:t>Values vs. Pointers</a:t>
+            </a:r>
+            <a:endParaRPr lang="en-US" altLang="en-US">
               <a:solidFill>
                 <a:srgbClr val="FD0062"/>
               </a:solidFill>
@@ -2187,47 +2160,74 @@
           <a:bodyPr/>
           <a:p>
             <a:r>
-              <a:rPr lang="" altLang="en-US" sz="2400"/>
+              <a:rPr lang="en-US" altLang="en-US" sz="2400">
+                <a:solidFill>
+                  <a:schemeClr val="bg1"/>
+                </a:solidFill>
+              </a:rPr>
               <a:t>A </a:t>
             </a:r>
             <a:r>
-              <a:rPr lang="" altLang="en-US" sz="2400">
-                <a:solidFill>
-                  <a:srgbClr val="37709F"/>
+              <a:rPr lang="en-US" altLang="en-US" sz="2400">
+                <a:solidFill>
+                  <a:srgbClr val="F7D97B"/>
                 </a:solidFill>
               </a:rPr>
               <a:t>value </a:t>
             </a:r>
             <a:r>
-              <a:rPr lang="" altLang="en-US" sz="2400"/>
+              <a:rPr lang="en-US" altLang="en-US" sz="2400">
+                <a:solidFill>
+                  <a:schemeClr val="bg1"/>
+                </a:solidFill>
+              </a:rPr>
               <a:t>type maps directly to data at an address in memory</a:t>
             </a:r>
-            <a:endParaRPr lang="" altLang="en-US" sz="2400"/>
+            <a:endParaRPr lang="en-US" altLang="en-US" sz="2400">
+              <a:solidFill>
+                <a:schemeClr val="bg1"/>
+              </a:solidFill>
+            </a:endParaRPr>
           </a:p>
           <a:p>
             <a:pPr lvl="1"/>
             <a:r>
-              <a:rPr lang="" altLang="en-US" sz="2160"/>
-              <a:t>Changing the </a:t>
-            </a:r>
-            <a:r>
-              <a:rPr lang="" altLang="en-US" sz="2160">
-                <a:solidFill>
-                  <a:srgbClr val="37709F"/>
-                </a:solidFill>
+              <a:rPr lang="en-US" altLang="en-US" sz="2160">
+                <a:solidFill>
+                  <a:schemeClr val="bg1"/>
+                </a:solidFill>
+              </a:rPr>
+              <a:t>Changing</a:t>
+            </a:r>
+            <a:r>
+              <a:rPr lang="en-US" altLang="en-US" sz="2160"/>
+              <a:t> a </a:t>
+            </a:r>
+            <a:r>
+              <a:rPr lang="en-US" altLang="en-US" sz="2160">
+                <a:solidFill>
+                  <a:srgbClr val="F7D97B"/>
+                </a:solidFill>
+                <a:effectLst>
+                  <a:outerShdw blurRad="38100" dist="38100" dir="2700000" algn="tl">
+                    <a:srgbClr val="000000">
+                      <a:alpha val="43137"/>
+                    </a:srgbClr>
+                  </a:outerShdw>
+                </a:effectLst>
               </a:rPr>
               <a:t>value </a:t>
             </a:r>
             <a:r>
-              <a:rPr lang="" altLang="en-US" sz="2160"/>
-              <a:t>of a value type means that the physical configuration of the memory register that stores the type changes:</a:t>
-            </a:r>
-            <a:endParaRPr lang="" altLang="en-US" sz="2160"/>
+              <a:rPr lang="en-US" altLang="en-US" sz="2160"/>
+              <a:t>type means that the physical configuration of the memory register that stores the type changes:</a:t>
+            </a:r>
+            <a:endParaRPr lang="en-US" altLang="en-US" sz="2160"/>
           </a:p>
           <a:p>
             <a:pPr lvl="2"/>
             <a:r>
-              <a:rPr lang="" altLang="en-US" sz="1920">
+              <a:rPr lang="en-US" altLang="en-US" sz="1920">
                 <a:solidFill>
                   <a:srgbClr val="FD0062"/>
                 </a:solidFill>
@@ -2235,11 +2235,11 @@
               <a:t>a</a:t>
             </a:r>
             <a:r>
-              <a:rPr lang="" altLang="en-US" sz="1920"/>
+              <a:rPr lang="en-US" altLang="en-US" sz="1920"/>
               <a:t>=1 =&gt; </a:t>
             </a:r>
             <a:r>
-              <a:rPr lang="" altLang="en-US" sz="1920">
+              <a:rPr lang="en-US" altLang="en-US" sz="1920">
                 <a:solidFill>
                   <a:srgbClr val="FD0062"/>
                 </a:solidFill>
@@ -2247,11 +2247,11 @@
               <a:t>a</a:t>
             </a:r>
             <a:r>
-              <a:rPr lang="" altLang="en-US" sz="1920"/>
+              <a:rPr lang="en-US" altLang="en-US" sz="1920"/>
               <a:t>++ =&gt; </a:t>
             </a:r>
             <a:r>
-              <a:rPr lang="" altLang="en-US" sz="1920">
+              <a:rPr lang="en-US" altLang="en-US" sz="1920">
                 <a:solidFill>
                   <a:srgbClr val="FD0062"/>
                 </a:solidFill>
@@ -2259,98 +2259,119 @@
               <a:t>a</a:t>
             </a:r>
             <a:r>
-              <a:rPr lang="" altLang="en-US" sz="1920"/>
+              <a:rPr lang="en-US" altLang="en-US" sz="1920"/>
               <a:t>=2</a:t>
             </a:r>
-            <a:endParaRPr lang="" altLang="en-US" sz="1920"/>
+            <a:endParaRPr lang="en-US" altLang="en-US" sz="1920"/>
           </a:p>
           <a:p>
             <a:pPr marL="0" lvl="0" indent="0">
               <a:buNone/>
             </a:pPr>
-            <a:endParaRPr lang="" altLang="en-US" sz="2400"/>
-          </a:p>
-          <a:p>
-            <a:r>
-              <a:rPr lang="" altLang="en-US" sz="2400"/>
+            <a:endParaRPr lang="en-US" altLang="en-US" sz="2400"/>
+          </a:p>
+          <a:p>
+            <a:r>
+              <a:rPr lang="en-US" altLang="en-US" sz="2400">
+                <a:solidFill>
+                  <a:schemeClr val="bg1"/>
+                </a:solidFill>
+              </a:rPr>
               <a:t>A </a:t>
             </a:r>
             <a:r>
               <a:rPr lang="en-US" altLang="en-US" sz="2400">
                 <a:solidFill>
-                  <a:srgbClr val="FFCF3E"/>
-                </a:solidFill>
-                <a:sym typeface="+mn-ea"/>
-              </a:rPr>
-              <a:t>poin</a:t>
-            </a:r>
-            <a:r>
-              <a:rPr lang="" altLang="en-US" sz="2400">
-                <a:solidFill>
-                  <a:srgbClr val="FFCF3E"/>
-                </a:solidFill>
-                <a:sym typeface="+mn-ea"/>
-              </a:rPr>
-              <a:t>ter </a:t>
-            </a:r>
-            <a:r>
-              <a:rPr lang="" altLang="en-US" sz="2400">
+                  <a:srgbClr val="F7D97B"/>
+                </a:solidFill>
+                <a:sym typeface="+mn-ea"/>
+              </a:rPr>
+              <a:t>pointer </a:t>
+            </a:r>
+            <a:r>
+              <a:rPr lang="en-US" altLang="en-US" sz="2400">
+                <a:solidFill>
+                  <a:schemeClr val="bg1"/>
+                </a:solidFill>
                 <a:sym typeface="+mn-ea"/>
               </a:rPr>
               <a:t>type references the address of a </a:t>
             </a:r>
             <a:r>
-              <a:rPr lang="" altLang="en-US" sz="2400">
-                <a:solidFill>
-                  <a:srgbClr val="37709F"/>
+              <a:rPr lang="en-US" altLang="en-US" sz="2400">
+                <a:solidFill>
+                  <a:srgbClr val="F7D97B"/>
                 </a:solidFill>
                 <a:sym typeface="+mn-ea"/>
               </a:rPr>
               <a:t>value </a:t>
             </a:r>
             <a:r>
-              <a:rPr lang="" altLang="en-US" sz="2400">
+              <a:rPr lang="en-US" altLang="en-US" sz="2400">
+                <a:solidFill>
+                  <a:schemeClr val="bg1"/>
+                </a:solidFill>
                 <a:sym typeface="+mn-ea"/>
               </a:rPr>
               <a:t>type</a:t>
             </a:r>
             <a:r>
-              <a:rPr lang="" altLang="en-US" sz="2400"/>
-              <a:t> - multiple pointers can reference the same address</a:t>
-            </a:r>
-            <a:endParaRPr lang="" altLang="en-US" sz="2400"/>
+              <a:rPr lang="en-US" altLang="en-US" sz="2400">
+                <a:solidFill>
+                  <a:schemeClr val="bg1"/>
+                </a:solidFill>
+              </a:rPr>
+              <a:t> - multiple </a:t>
+            </a:r>
+            <a:r>
+              <a:rPr lang="en-US" altLang="en-US" sz="2400">
+                <a:solidFill>
+                  <a:srgbClr val="F7D97B"/>
+                </a:solidFill>
+              </a:rPr>
+              <a:t>pointers </a:t>
+            </a:r>
+            <a:r>
+              <a:rPr lang="en-US" altLang="en-US" sz="2400">
+                <a:solidFill>
+                  <a:schemeClr val="bg1"/>
+                </a:solidFill>
+              </a:rPr>
+              <a:t>can reference the same address</a:t>
+            </a:r>
+            <a:endParaRPr lang="en-US" altLang="en-US" sz="2400">
+              <a:solidFill>
+                <a:schemeClr val="bg1"/>
+              </a:solidFill>
+            </a:endParaRPr>
           </a:p>
           <a:p>
             <a:pPr lvl="1"/>
             <a:r>
-              <a:rPr lang="" altLang="en-US" sz="2160"/>
+              <a:rPr lang="en-US" altLang="en-US" sz="2160">
+                <a:solidFill>
+                  <a:schemeClr val="bg1"/>
+                </a:solidFill>
+              </a:rPr>
               <a:t>Changing a </a:t>
             </a:r>
             <a:r>
-              <a:rPr lang="" altLang="en-US" sz="2160">
-                <a:solidFill>
-                  <a:srgbClr val="FFCF3E"/>
+              <a:rPr lang="en-US" altLang="en-US" sz="2160">
+                <a:solidFill>
+                  <a:srgbClr val="F7D97B"/>
                 </a:solidFill>
               </a:rPr>
               <a:t>pointer </a:t>
             </a:r>
             <a:r>
-              <a:rPr lang="" altLang="en-US" sz="2160"/>
-              <a:t>changes the memory state at the address where the referenced </a:t>
-            </a:r>
-            <a:r>
-              <a:rPr lang="" altLang="en-US" sz="2160">
-                <a:solidFill>
-                  <a:srgbClr val="37709F"/>
-                </a:solidFill>
-              </a:rPr>
-              <a:t>value </a:t>
-            </a:r>
-            <a:r>
-              <a:rPr lang="" altLang="en-US" sz="2160"/>
-              <a:t>is held:</a:t>
-            </a:r>
-            <a:endParaRPr lang="" altLang="en-US" sz="2160"/>
+              <a:rPr lang="en-US" altLang="en-US" sz="2160">
+                <a:solidFill>
+                  <a:schemeClr val="bg1"/>
+                </a:solidFill>
+              </a:rPr>
+              <a:t>changes the memory state at the address where the referenced value is held:</a:t>
+            </a:r>
+            <a:endParaRPr lang="en-US" altLang="en-US" sz="2160"/>
           </a:p>
           <a:p>
             <a:pPr lvl="2"/>
@@ -2400,7 +2421,7 @@
               <a:t> =&gt; </a:t>
             </a:r>
             <a:r>
-              <a:rPr lang="" altLang="en-US" sz="1920">
+              <a:rPr lang="en-US" altLang="en-US" sz="1920">
                 <a:solidFill>
                   <a:srgbClr val="7CE0D1"/>
                 </a:solidFill>
@@ -2451,11 +2472,11 @@
           <a:p>
             <a:pPr lvl="1"/>
             <a:r>
-              <a:rPr lang="" altLang="en-US" sz="2160"/>
+              <a:rPr lang="en-US" altLang="en-US" sz="2160"/>
               <a:t>If the </a:t>
             </a:r>
             <a:r>
-              <a:rPr lang="" altLang="en-US" sz="2160">
+              <a:rPr lang="en-US" altLang="en-US" sz="2160">
                 <a:solidFill>
                   <a:srgbClr val="FD0062"/>
                 </a:solidFill>
@@ -2463,43 +2484,51 @@
               <a:t>referenced </a:t>
             </a:r>
             <a:r>
-              <a:rPr lang="" altLang="en-US" sz="2160">
-                <a:solidFill>
-                  <a:srgbClr val="37709F"/>
+              <a:rPr lang="en-US" altLang="en-US" sz="2160">
+                <a:solidFill>
+                  <a:srgbClr val="F7D97B"/>
                 </a:solidFill>
               </a:rPr>
               <a:t>value </a:t>
             </a:r>
             <a:r>
-              <a:rPr lang="" altLang="en-US" sz="2160"/>
+              <a:rPr lang="en-US" altLang="en-US" sz="2160">
+                <a:solidFill>
+                  <a:schemeClr val="bg1"/>
+                </a:solidFill>
+              </a:rPr>
               <a:t>type is changed, then so is the </a:t>
             </a:r>
             <a:r>
-              <a:rPr lang="" altLang="en-US" sz="2160">
-                <a:solidFill>
-                  <a:srgbClr val="37709F"/>
+              <a:rPr lang="en-US" altLang="en-US" sz="2160">
+                <a:solidFill>
+                  <a:srgbClr val="F7D97B"/>
                 </a:solidFill>
               </a:rPr>
               <a:t>value </a:t>
             </a:r>
             <a:r>
-              <a:rPr lang="" altLang="en-US" sz="2160"/>
+              <a:rPr lang="en-US" altLang="en-US" sz="2160">
+                <a:solidFill>
+                  <a:schemeClr val="bg1"/>
+                </a:solidFill>
+              </a:rPr>
               <a:t>associated with the </a:t>
             </a:r>
             <a:r>
-              <a:rPr lang="" altLang="en-US" sz="2160">
-                <a:solidFill>
-                  <a:srgbClr val="FFCF3E"/>
+              <a:rPr lang="en-US" altLang="en-US" sz="2160">
+                <a:solidFill>
+                  <a:srgbClr val="F7D97B"/>
                 </a:solidFill>
               </a:rPr>
               <a:t>pointer</a:t>
             </a:r>
-            <a:endParaRPr lang="" altLang="en-US" sz="2160"/>
+            <a:endParaRPr lang="en-US" altLang="en-US" sz="2160"/>
           </a:p>
           <a:p>
             <a:pPr lvl="2"/>
             <a:r>
-              <a:rPr lang="" altLang="en-US" sz="1920">
+              <a:rPr lang="en-US" altLang="en-US" sz="1920">
                 <a:solidFill>
                   <a:srgbClr val="FD0062"/>
                 </a:solidFill>
@@ -2507,11 +2536,11 @@
               <a:t>a</a:t>
             </a:r>
             <a:r>
-              <a:rPr lang="" altLang="en-US" sz="1920"/>
+              <a:rPr lang="en-US" altLang="en-US" sz="1920"/>
               <a:t>=1 =&gt; </a:t>
             </a:r>
             <a:r>
-              <a:rPr lang="" altLang="en-US" sz="1920">
+              <a:rPr lang="en-US" altLang="en-US" sz="1920">
                 <a:solidFill>
                   <a:srgbClr val="7CE0D1"/>
                 </a:solidFill>
@@ -2519,11 +2548,11 @@
               <a:t>b</a:t>
             </a:r>
             <a:r>
-              <a:rPr lang="" altLang="en-US" sz="1920"/>
+              <a:rPr lang="en-US" altLang="en-US" sz="1920"/>
               <a:t>=</a:t>
             </a:r>
             <a:r>
-              <a:rPr lang="" altLang="en-US" sz="1920">
+              <a:rPr lang="en-US" altLang="en-US" sz="1920">
                 <a:solidFill>
                   <a:srgbClr val="FD0062"/>
                 </a:solidFill>
@@ -2531,11 +2560,11 @@
               <a:t>a</a:t>
             </a:r>
             <a:r>
-              <a:rPr lang="" altLang="en-US" sz="1920"/>
+              <a:rPr lang="en-US" altLang="en-US" sz="1920"/>
               <a:t> =&gt; </a:t>
             </a:r>
             <a:r>
-              <a:rPr lang="" altLang="en-US" sz="1920">
+              <a:rPr lang="en-US" altLang="en-US" sz="1920">
                 <a:solidFill>
                   <a:srgbClr val="FD0062"/>
                 </a:solidFill>
@@ -2543,11 +2572,11 @@
               <a:t>a</a:t>
             </a:r>
             <a:r>
-              <a:rPr lang="" altLang="en-US" sz="1920"/>
+              <a:rPr lang="en-US" altLang="en-US" sz="1920"/>
               <a:t>++ =&gt; </a:t>
             </a:r>
             <a:r>
-              <a:rPr lang="" altLang="en-US" sz="1920">
+              <a:rPr lang="en-US" altLang="en-US" sz="1920">
                 <a:solidFill>
                   <a:srgbClr val="7CE0D1"/>
                 </a:solidFill>
@@ -2555,11 +2584,11 @@
               <a:t>b</a:t>
             </a:r>
             <a:r>
-              <a:rPr lang="" altLang="en-US" sz="1920"/>
+              <a:rPr lang="en-US" altLang="en-US" sz="1920"/>
               <a:t>=</a:t>
             </a:r>
             <a:r>
-              <a:rPr lang="" altLang="en-US" sz="1920">
+              <a:rPr lang="en-US" altLang="en-US" sz="1920">
                 <a:solidFill>
                   <a:srgbClr val="FD0062"/>
                 </a:solidFill>
@@ -2567,25 +2596,1952 @@
               <a:t>a</a:t>
             </a:r>
             <a:r>
-              <a:rPr lang="" altLang="en-US" sz="1920"/>
+              <a:rPr lang="en-US" altLang="en-US" sz="1920"/>
               <a:t>=2</a:t>
             </a:r>
-            <a:endParaRPr lang="" altLang="en-US" sz="1920"/>
-          </a:p>
-          <a:p>
-            <a:endParaRPr lang="" altLang="en-US" sz="1620"/>
+            <a:endParaRPr lang="en-US" altLang="en-US" sz="1920"/>
+          </a:p>
+          <a:p>
+            <a:endParaRPr lang="en-US" altLang="en-US" sz="1620"/>
           </a:p>
           <a:p>
             <a:pPr marL="0" lvl="0" indent="0">
               <a:buNone/>
             </a:pPr>
-            <a:endParaRPr lang="" altLang="en-US"/>
+            <a:endParaRPr lang="en-US" altLang="en-US"/>
           </a:p>
           <a:p>
             <a:pPr marL="457200" lvl="1" indent="0">
               <a:buNone/>
             </a:pPr>
+            <a:endParaRPr lang="en-US" altLang="en-US"/>
+          </a:p>
+        </p:txBody>
+      </p:sp>
+    </p:spTree>
+  </p:cSld>
+  <p:clrMapOvr>
+    <a:masterClrMapping/>
+  </p:clrMapOvr>
+</p:sld>
+</file>
+
+<file path=ppt/slides/slide11.xml><?xml version="1.0" encoding="utf-8"?>
+<p:sld xmlns:a="http://schemas.openxmlformats.org/drawingml/2006/main" xmlns:r="http://schemas.openxmlformats.org/officeDocument/2006/relationships" xmlns:p="http://schemas.openxmlformats.org/presentationml/2006/main">
+  <p:cSld>
+    <p:spTree>
+      <p:nvGrpSpPr>
+        <p:cNvPr id="1" name=""/>
+        <p:cNvGrpSpPr/>
+        <p:nvPr/>
+      </p:nvGrpSpPr>
+      <p:grpSpPr/>
+      <p:sp>
+        <p:nvSpPr>
+          <p:cNvPr id="2" name="Title 1"/>
+          <p:cNvSpPr>
+            <a:spLocks noGrp="1"/>
+          </p:cNvSpPr>
+          <p:nvPr>
+            <p:ph type="title"/>
+          </p:nvPr>
+        </p:nvSpPr>
+        <p:spPr/>
+        <p:txBody>
+          <a:bodyPr/>
+          <a:p>
+            <a:r>
+              <a:rPr lang="" altLang="en-US"/>
+              <a:t>Taxonomy - </a:t>
+            </a:r>
+            <a:r>
+              <a:rPr lang="" altLang="en-US">
+                <a:solidFill>
+                  <a:srgbClr val="FD0062"/>
+                </a:solidFill>
+              </a:rPr>
+              <a:t>Types</a:t>
+            </a:r>
+            <a:endParaRPr lang="" altLang="en-US">
+              <a:solidFill>
+                <a:srgbClr val="FD0062"/>
+              </a:solidFill>
+            </a:endParaRPr>
+          </a:p>
+        </p:txBody>
+      </p:sp>
+      <p:sp>
+        <p:nvSpPr>
+          <p:cNvPr id="3" name="Content Placeholder 2"/>
+          <p:cNvSpPr>
+            <a:spLocks noGrp="1"/>
+          </p:cNvSpPr>
+          <p:nvPr>
+            <p:ph idx="1"/>
+          </p:nvPr>
+        </p:nvSpPr>
+        <p:spPr>
+          <a:xfrm>
+            <a:off x="167005" y="1122680"/>
+            <a:ext cx="11857355" cy="5469255"/>
+          </a:xfrm>
+        </p:spPr>
+        <p:txBody>
+          <a:bodyPr>
+            <a:normAutofit lnSpcReduction="10000"/>
+          </a:bodyPr>
+          <a:p>
+            <a:r>
+              <a:rPr lang="" altLang="en-US"/>
+              <a:t>When you create a variable in any high-level language, the translator has to decide how to store it in physical memory</a:t>
+            </a:r>
             <a:endParaRPr lang="" altLang="en-US"/>
+          </a:p>
+          <a:p>
+            <a:pPr lvl="1"/>
+            <a:r>
+              <a:rPr lang="" altLang="en-US"/>
+              <a:t>Some languages require user specification, others allow for contextual specification.</a:t>
+            </a:r>
+            <a:endParaRPr lang="" altLang="en-US"/>
+          </a:p>
+          <a:p>
+            <a:pPr lvl="1"/>
+            <a:r>
+              <a:rPr lang="" altLang="en-US"/>
+              <a:t>Generally interpreted languages are more flexible in typing</a:t>
+            </a:r>
+            <a:endParaRPr lang="" altLang="en-US"/>
+          </a:p>
+          <a:p>
+            <a:pPr lvl="0"/>
+            <a:endParaRPr lang="" altLang="en-US"/>
+          </a:p>
+          <a:p>
+            <a:pPr lvl="0"/>
+            <a:r>
+              <a:rPr lang="" altLang="en-US"/>
+              <a:t>This is necessary because different categories of information require defferent methods of storage</a:t>
+            </a:r>
+            <a:endParaRPr lang="" altLang="en-US"/>
+          </a:p>
+          <a:p>
+            <a:pPr lvl="0"/>
+            <a:endParaRPr lang="" altLang="en-US"/>
+          </a:p>
+          <a:p>
+            <a:pPr lvl="0"/>
+            <a:r>
+              <a:rPr lang="" altLang="en-US"/>
+              <a:t>Most high-level languages have a small number (&lt; 10) “</a:t>
+            </a:r>
+            <a:r>
+              <a:rPr lang="" altLang="en-US">
+                <a:solidFill>
+                  <a:srgbClr val="FD0062"/>
+                </a:solidFill>
+              </a:rPr>
+              <a:t>native</a:t>
+            </a:r>
+            <a:r>
+              <a:rPr lang="" altLang="en-US"/>
+              <a:t>” types on which everything else is built</a:t>
+            </a:r>
+            <a:endParaRPr lang="" altLang="en-US"/>
+          </a:p>
+          <a:p>
+            <a:pPr lvl="1"/>
+            <a:r>
+              <a:rPr lang="" altLang="en-US">
+                <a:solidFill>
+                  <a:srgbClr val="FD0062"/>
+                </a:solidFill>
+              </a:rPr>
+              <a:t>Native </a:t>
+            </a:r>
+            <a:r>
+              <a:rPr lang="" altLang="en-US"/>
+              <a:t>types correspond to physical memory objects at defined addresses in memory</a:t>
+            </a:r>
+            <a:endParaRPr lang="" altLang="en-US"/>
+          </a:p>
+          <a:p>
+            <a:pPr lvl="0"/>
+            <a:endParaRPr lang="" altLang="en-US"/>
+          </a:p>
+          <a:p>
+            <a:pPr lvl="0"/>
+            <a:r>
+              <a:rPr lang="" altLang="en-US"/>
+              <a:t>Stored variables, regardless of type consist of an address and a data field. The translator maintains a table which relates human readable handles to addresses in memory</a:t>
+            </a:r>
+            <a:endParaRPr lang="" altLang="en-US"/>
+          </a:p>
+        </p:txBody>
+      </p:sp>
+    </p:spTree>
+  </p:cSld>
+  <p:clrMapOvr>
+    <a:masterClrMapping/>
+  </p:clrMapOvr>
+</p:sld>
+</file>
+
+<file path=ppt/slides/slide12.xml><?xml version="1.0" encoding="utf-8"?>
+<p:sld xmlns:a="http://schemas.openxmlformats.org/drawingml/2006/main" xmlns:r="http://schemas.openxmlformats.org/officeDocument/2006/relationships" xmlns:p="http://schemas.openxmlformats.org/presentationml/2006/main">
+  <p:cSld>
+    <p:spTree>
+      <p:nvGrpSpPr>
+        <p:cNvPr id="1" name=""/>
+        <p:cNvGrpSpPr/>
+        <p:nvPr/>
+      </p:nvGrpSpPr>
+      <p:grpSpPr/>
+      <p:sp>
+        <p:nvSpPr>
+          <p:cNvPr id="2" name="Title 1"/>
+          <p:cNvSpPr>
+            <a:spLocks noGrp="1"/>
+          </p:cNvSpPr>
+          <p:nvPr>
+            <p:ph type="title"/>
+          </p:nvPr>
+        </p:nvSpPr>
+        <p:spPr/>
+        <p:txBody>
+          <a:bodyPr/>
+          <a:p>
+            <a:r>
+              <a:rPr lang="" altLang="en-US"/>
+              <a:t>Types - </a:t>
+            </a:r>
+            <a:r>
+              <a:rPr lang="" altLang="en-US">
+                <a:solidFill>
+                  <a:srgbClr val="FD0062"/>
+                </a:solidFill>
+              </a:rPr>
+              <a:t>Primitives (Value Types)</a:t>
+            </a:r>
+            <a:endParaRPr lang="" altLang="en-US">
+              <a:solidFill>
+                <a:srgbClr val="FD0062"/>
+              </a:solidFill>
+            </a:endParaRPr>
+          </a:p>
+        </p:txBody>
+      </p:sp>
+      <p:sp>
+        <p:nvSpPr>
+          <p:cNvPr id="3" name="Content Placeholder 2"/>
+          <p:cNvSpPr>
+            <a:spLocks noGrp="1"/>
+          </p:cNvSpPr>
+          <p:nvPr>
+            <p:ph idx="1"/>
+          </p:nvPr>
+        </p:nvSpPr>
+        <p:spPr>
+          <a:xfrm>
+            <a:off x="167005" y="1186815"/>
+            <a:ext cx="11857355" cy="5682615"/>
+          </a:xfrm>
+        </p:spPr>
+        <p:txBody>
+          <a:bodyPr>
+            <a:normAutofit lnSpcReduction="20000"/>
+          </a:bodyPr>
+          <a:p>
+            <a:r>
+              <a:rPr lang="" altLang="en-US" sz="2400"/>
+              <a:t>The most basic way to store information is to have a handle which corresponds to a single value - this is a value type</a:t>
+            </a:r>
+            <a:endParaRPr lang="" altLang="en-US" sz="2400"/>
+          </a:p>
+          <a:p>
+            <a:endParaRPr lang="" altLang="en-US" sz="2400"/>
+          </a:p>
+          <a:p>
+            <a:r>
+              <a:rPr lang="" altLang="en-US" sz="2400"/>
+              <a:t>A primitive type is the most basic way of representing a value ina givne language. </a:t>
+            </a:r>
+            <a:endParaRPr lang="" altLang="en-US" sz="2400"/>
+          </a:p>
+          <a:p>
+            <a:endParaRPr lang="" altLang="en-US" sz="2400"/>
+          </a:p>
+          <a:p>
+            <a:r>
+              <a:rPr lang="" altLang="en-US" sz="2400"/>
+              <a:t>Most languages have four varieties of native value types which are referred to as “primitives”:</a:t>
+            </a:r>
+            <a:endParaRPr lang="" altLang="en-US" sz="2400"/>
+          </a:p>
+          <a:p>
+            <a:endParaRPr lang="" altLang="en-US" sz="2400"/>
+          </a:p>
+          <a:p>
+            <a:pPr marL="0" lvl="0" indent="0" algn="ctr">
+              <a:buNone/>
+            </a:pPr>
+            <a:r>
+              <a:rPr lang="" altLang="en-US" sz="2400"/>
+              <a:t>int - represents an integer</a:t>
+            </a:r>
+            <a:endParaRPr lang="" altLang="en-US" sz="2400"/>
+          </a:p>
+          <a:p>
+            <a:pPr marL="0" lvl="0" indent="0" algn="ctr">
+              <a:buNone/>
+            </a:pPr>
+            <a:r>
+              <a:rPr lang="" altLang="en-US" sz="2400"/>
+              <a:t>float - represents a real number</a:t>
+            </a:r>
+            <a:endParaRPr lang="" altLang="en-US" sz="2400"/>
+          </a:p>
+          <a:p>
+            <a:pPr marL="0" lvl="0" indent="0" algn="ctr">
+              <a:buNone/>
+            </a:pPr>
+            <a:r>
+              <a:rPr lang="" altLang="en-US" sz="2400"/>
+              <a:t>bool - represents a truth value</a:t>
+            </a:r>
+            <a:endParaRPr lang="" altLang="en-US" sz="2400"/>
+          </a:p>
+          <a:p>
+            <a:pPr marL="0" lvl="0" indent="0" algn="ctr">
+              <a:buNone/>
+            </a:pPr>
+            <a:r>
+              <a:rPr lang="" altLang="en-US" sz="2400"/>
+              <a:t>char* - represents an ASCII character</a:t>
+            </a:r>
+            <a:endParaRPr lang="" altLang="en-US" sz="2400"/>
+          </a:p>
+          <a:p>
+            <a:pPr marL="0" lvl="0" indent="0" algn="l">
+              <a:buNone/>
+            </a:pPr>
+            <a:endParaRPr lang="" altLang="en-US" i="1">
+              <a:sym typeface="+mn-ea"/>
+            </a:endParaRPr>
+          </a:p>
+          <a:p>
+            <a:pPr marL="0" lvl="0" indent="0" algn="l">
+              <a:buNone/>
+            </a:pPr>
+            <a:r>
+              <a:rPr lang="" altLang="en-US" i="1">
+                <a:sym typeface="+mn-ea"/>
+              </a:rPr>
+              <a:t>*Python doesn’t have a char primitive</a:t>
+            </a:r>
+            <a:endParaRPr lang="" altLang="en-US" i="1">
+              <a:sym typeface="+mn-ea"/>
+            </a:endParaRPr>
+          </a:p>
+        </p:txBody>
+      </p:sp>
+    </p:spTree>
+  </p:cSld>
+  <p:clrMapOvr>
+    <a:masterClrMapping/>
+  </p:clrMapOvr>
+</p:sld>
+</file>
+
+<file path=ppt/slides/slide13.xml><?xml version="1.0" encoding="utf-8"?>
+<p:sld xmlns:a="http://schemas.openxmlformats.org/drawingml/2006/main" xmlns:r="http://schemas.openxmlformats.org/officeDocument/2006/relationships" xmlns:p="http://schemas.openxmlformats.org/presentationml/2006/main">
+  <p:cSld>
+    <p:spTree>
+      <p:nvGrpSpPr>
+        <p:cNvPr id="1" name=""/>
+        <p:cNvGrpSpPr/>
+        <p:nvPr/>
+      </p:nvGrpSpPr>
+      <p:grpSpPr/>
+      <p:sp>
+        <p:nvSpPr>
+          <p:cNvPr id="2" name="Title 1"/>
+          <p:cNvSpPr>
+            <a:spLocks noGrp="1"/>
+          </p:cNvSpPr>
+          <p:nvPr>
+            <p:ph type="title"/>
+          </p:nvPr>
+        </p:nvSpPr>
+        <p:spPr/>
+        <p:txBody>
+          <a:bodyPr/>
+          <a:p>
+            <a:r>
+              <a:rPr lang="en-US" altLang="en-US"/>
+              <a:t>Types - </a:t>
+            </a:r>
+            <a:r>
+              <a:rPr lang="en-US" altLang="en-US">
+                <a:solidFill>
+                  <a:srgbClr val="FD0062"/>
+                </a:solidFill>
+                <a:sym typeface="+mn-ea"/>
+              </a:rPr>
+              <a:t>Primitives (Value Types)</a:t>
+            </a:r>
+            <a:endParaRPr lang="" altLang="en-US">
+              <a:solidFill>
+                <a:srgbClr val="FD0062"/>
+              </a:solidFill>
+            </a:endParaRPr>
+          </a:p>
+        </p:txBody>
+      </p:sp>
+      <p:sp>
+        <p:nvSpPr>
+          <p:cNvPr id="3" name="Content Placeholder 2"/>
+          <p:cNvSpPr>
+            <a:spLocks noGrp="1"/>
+          </p:cNvSpPr>
+          <p:nvPr>
+            <p:ph idx="1"/>
+          </p:nvPr>
+        </p:nvSpPr>
+        <p:spPr>
+          <a:xfrm>
+            <a:off x="167005" y="1122680"/>
+            <a:ext cx="11857355" cy="5490845"/>
+          </a:xfrm>
+        </p:spPr>
+        <p:txBody>
+          <a:bodyPr>
+            <a:normAutofit lnSpcReduction="10000"/>
+          </a:bodyPr>
+          <a:p>
+            <a:endParaRPr lang="en-US" altLang="en-US" sz="2400"/>
+          </a:p>
+          <a:p>
+            <a:pPr marL="0" lvl="0" indent="0" algn="ctr">
+              <a:buNone/>
+            </a:pPr>
+            <a:r>
+              <a:rPr lang="en-US" altLang="en-US" sz="2800">
+                <a:solidFill>
+                  <a:srgbClr val="FD0062"/>
+                </a:solidFill>
+              </a:rPr>
+              <a:t>int - represents an integer</a:t>
+            </a:r>
+            <a:endParaRPr lang="en-US" altLang="en-US" sz="2800">
+              <a:solidFill>
+                <a:srgbClr val="FD0062"/>
+              </a:solidFill>
+            </a:endParaRPr>
+          </a:p>
+          <a:p>
+            <a:pPr marL="0" lvl="0" indent="0" algn="ctr">
+              <a:buNone/>
+            </a:pPr>
+            <a:r>
+              <a:rPr lang="en-US" altLang="en-US" sz="2800">
+                <a:solidFill>
+                  <a:srgbClr val="7CE0D1"/>
+                </a:solidFill>
+              </a:rPr>
+              <a:t>float - represents a real number</a:t>
+            </a:r>
+            <a:endParaRPr lang="en-US" altLang="en-US" sz="2800"/>
+          </a:p>
+          <a:p>
+            <a:pPr marL="0" lvl="0" indent="0" algn="ctr">
+              <a:buNone/>
+            </a:pPr>
+            <a:r>
+              <a:rPr lang="en-US" altLang="en-US" sz="2800">
+                <a:solidFill>
+                  <a:srgbClr val="F7D97B"/>
+                </a:solidFill>
+              </a:rPr>
+              <a:t>bool - represents a truth value</a:t>
+            </a:r>
+            <a:endParaRPr lang="en-US" altLang="en-US" sz="2800"/>
+          </a:p>
+          <a:p>
+            <a:pPr marL="0" lvl="0" indent="0" algn="ctr">
+              <a:buNone/>
+            </a:pPr>
+            <a:endParaRPr lang="en-US" altLang="en-US" sz="2800"/>
+          </a:p>
+          <a:p>
+            <a:pPr marL="0" lvl="0" indent="0" algn="ctr">
+              <a:buNone/>
+            </a:pPr>
+            <a:endParaRPr lang="en-US" altLang="en-US" sz="2800" i="1">
+              <a:sym typeface="+mn-ea"/>
+            </a:endParaRPr>
+          </a:p>
+          <a:p>
+            <a:pPr lvl="0" algn="l"/>
+            <a:r>
+              <a:rPr lang="" altLang="en-US" sz="2800">
+                <a:solidFill>
+                  <a:srgbClr val="FD0062"/>
+                </a:solidFill>
+                <a:sym typeface="+mn-ea"/>
+              </a:rPr>
+              <a:t>Numeric </a:t>
+            </a:r>
+            <a:r>
+              <a:rPr lang="" altLang="en-US" sz="2800">
+                <a:sym typeface="+mn-ea"/>
+              </a:rPr>
+              <a:t>types in Python include ints and floats</a:t>
+            </a:r>
+            <a:endParaRPr lang="" altLang="en-US" sz="2800">
+              <a:sym typeface="+mn-ea"/>
+            </a:endParaRPr>
+          </a:p>
+          <a:p>
+            <a:pPr lvl="0" algn="l"/>
+            <a:r>
+              <a:rPr lang="" altLang="en-US" sz="2800">
+                <a:sym typeface="+mn-ea"/>
+              </a:rPr>
+              <a:t>Python typing is contextual:</a:t>
+            </a:r>
+            <a:endParaRPr lang="" altLang="en-US" sz="2800">
+              <a:sym typeface="+mn-ea"/>
+            </a:endParaRPr>
+          </a:p>
+          <a:p>
+            <a:pPr lvl="1" algn="l"/>
+            <a:r>
+              <a:rPr lang="" altLang="en-US" sz="2400">
+                <a:sym typeface="+mn-ea"/>
+              </a:rPr>
+              <a:t>a = 1 - a will be an </a:t>
+            </a:r>
+            <a:r>
+              <a:rPr lang="" altLang="en-US" sz="2400">
+                <a:solidFill>
+                  <a:srgbClr val="FD0062"/>
+                </a:solidFill>
+                <a:sym typeface="+mn-ea"/>
+              </a:rPr>
+              <a:t>int</a:t>
+            </a:r>
+            <a:endParaRPr lang="" altLang="en-US" sz="2400">
+              <a:sym typeface="+mn-ea"/>
+            </a:endParaRPr>
+          </a:p>
+          <a:p>
+            <a:pPr lvl="1" algn="l"/>
+            <a:r>
+              <a:rPr lang="" altLang="en-US" sz="2400">
+                <a:sym typeface="+mn-ea"/>
+              </a:rPr>
+              <a:t>a = 1. - a will be a </a:t>
+            </a:r>
+            <a:r>
+              <a:rPr lang="" altLang="en-US" sz="2400">
+                <a:solidFill>
+                  <a:srgbClr val="7CE0D1"/>
+                </a:solidFill>
+                <a:sym typeface="+mn-ea"/>
+              </a:rPr>
+              <a:t>float</a:t>
+            </a:r>
+            <a:endParaRPr lang="" altLang="en-US" sz="2400">
+              <a:sym typeface="+mn-ea"/>
+            </a:endParaRPr>
+          </a:p>
+          <a:p>
+            <a:pPr lvl="1" algn="l"/>
+            <a:r>
+              <a:rPr lang="" altLang="en-US" sz="2400">
+                <a:sym typeface="+mn-ea"/>
+              </a:rPr>
+              <a:t>a = True - a will be a </a:t>
+            </a:r>
+            <a:r>
+              <a:rPr lang="" altLang="en-US" sz="2400">
+                <a:solidFill>
+                  <a:srgbClr val="F7D97B"/>
+                </a:solidFill>
+                <a:sym typeface="+mn-ea"/>
+              </a:rPr>
+              <a:t>bool</a:t>
+            </a:r>
+            <a:endParaRPr lang="" altLang="en-US" sz="2400">
+              <a:solidFill>
+                <a:srgbClr val="7CE0D1"/>
+              </a:solidFill>
+              <a:sym typeface="+mn-ea"/>
+            </a:endParaRPr>
+          </a:p>
+        </p:txBody>
+      </p:sp>
+    </p:spTree>
+  </p:cSld>
+  <p:clrMapOvr>
+    <a:masterClrMapping/>
+  </p:clrMapOvr>
+</p:sld>
+</file>
+
+<file path=ppt/slides/slide14.xml><?xml version="1.0" encoding="utf-8"?>
+<p:sld xmlns:a="http://schemas.openxmlformats.org/drawingml/2006/main" xmlns:r="http://schemas.openxmlformats.org/officeDocument/2006/relationships" xmlns:p="http://schemas.openxmlformats.org/presentationml/2006/main">
+  <p:cSld>
+    <p:spTree>
+      <p:nvGrpSpPr>
+        <p:cNvPr id="1" name=""/>
+        <p:cNvGrpSpPr/>
+        <p:nvPr/>
+      </p:nvGrpSpPr>
+      <p:grpSpPr/>
+      <p:sp>
+        <p:nvSpPr>
+          <p:cNvPr id="2" name="Title 1"/>
+          <p:cNvSpPr>
+            <a:spLocks noGrp="1"/>
+          </p:cNvSpPr>
+          <p:nvPr>
+            <p:ph type="title"/>
+          </p:nvPr>
+        </p:nvSpPr>
+        <p:spPr/>
+        <p:txBody>
+          <a:bodyPr/>
+          <a:p>
+            <a:r>
+              <a:rPr lang="en-US" altLang="en-US"/>
+              <a:t>Types - </a:t>
+            </a:r>
+            <a:r>
+              <a:rPr lang="en-US" altLang="en-US">
+                <a:solidFill>
+                  <a:srgbClr val="FD0062"/>
+                </a:solidFill>
+                <a:sym typeface="+mn-ea"/>
+              </a:rPr>
+              <a:t>Primitives (Value Types)</a:t>
+            </a:r>
+            <a:endParaRPr lang="en-US" altLang="en-US">
+              <a:solidFill>
+                <a:srgbClr val="FD0062"/>
+              </a:solidFill>
+            </a:endParaRPr>
+          </a:p>
+        </p:txBody>
+      </p:sp>
+      <p:sp>
+        <p:nvSpPr>
+          <p:cNvPr id="3" name="Content Placeholder 2"/>
+          <p:cNvSpPr>
+            <a:spLocks noGrp="1"/>
+          </p:cNvSpPr>
+          <p:nvPr>
+            <p:ph idx="1"/>
+          </p:nvPr>
+        </p:nvSpPr>
+        <p:spPr>
+          <a:xfrm>
+            <a:off x="167005" y="1122680"/>
+            <a:ext cx="11857355" cy="5490845"/>
+          </a:xfrm>
+        </p:spPr>
+        <p:txBody>
+          <a:bodyPr>
+            <a:normAutofit/>
+          </a:bodyPr>
+          <a:p>
+            <a:r>
+              <a:rPr lang="" altLang="en-US" sz="2400">
+                <a:solidFill>
+                  <a:schemeClr val="bg1"/>
+                </a:solidFill>
+                <a:sym typeface="+mn-ea"/>
+              </a:rPr>
+              <a:t>Arithmetic operations can be done between numeric types and bools</a:t>
+            </a:r>
+            <a:endParaRPr lang="" altLang="en-US" sz="2400">
+              <a:solidFill>
+                <a:schemeClr val="bg1"/>
+              </a:solidFill>
+              <a:sym typeface="+mn-ea"/>
+            </a:endParaRPr>
+          </a:p>
+          <a:p>
+            <a:endParaRPr lang="" altLang="en-US" sz="2400">
+              <a:solidFill>
+                <a:schemeClr val="bg1"/>
+              </a:solidFill>
+              <a:sym typeface="+mn-ea"/>
+            </a:endParaRPr>
+          </a:p>
+          <a:p>
+            <a:r>
+              <a:rPr lang="" altLang="en-US" sz="2400">
+                <a:solidFill>
+                  <a:schemeClr val="bg1"/>
+                </a:solidFill>
+                <a:sym typeface="+mn-ea"/>
+              </a:rPr>
+              <a:t>The result of an arithmetic operation between two variables of different types will be of the more </a:t>
+            </a:r>
+            <a:r>
+              <a:rPr lang="" altLang="en-US" sz="2400">
+                <a:solidFill>
+                  <a:srgbClr val="7CE0D1"/>
+                </a:solidFill>
+                <a:sym typeface="+mn-ea"/>
+              </a:rPr>
+              <a:t>general </a:t>
+            </a:r>
+            <a:r>
+              <a:rPr lang="" altLang="en-US" sz="2400">
+                <a:solidFill>
+                  <a:schemeClr val="bg1"/>
+                </a:solidFill>
+                <a:sym typeface="+mn-ea"/>
+              </a:rPr>
+              <a:t>type:</a:t>
+            </a:r>
+            <a:endParaRPr lang="" altLang="en-US" sz="2400">
+              <a:solidFill>
+                <a:schemeClr val="bg1"/>
+              </a:solidFill>
+              <a:sym typeface="+mn-ea"/>
+            </a:endParaRPr>
+          </a:p>
+          <a:p>
+            <a:pPr lvl="1"/>
+            <a:r>
+              <a:rPr lang="" altLang="en-US" sz="2160">
+                <a:solidFill>
+                  <a:schemeClr val="bg1"/>
+                </a:solidFill>
+                <a:sym typeface="+mn-ea"/>
+              </a:rPr>
+              <a:t>bool &lt; int &lt; float in terms of </a:t>
+            </a:r>
+            <a:r>
+              <a:rPr lang="" altLang="en-US" sz="2160">
+                <a:solidFill>
+                  <a:srgbClr val="7CE0D1"/>
+                </a:solidFill>
+                <a:sym typeface="+mn-ea"/>
+              </a:rPr>
+              <a:t>generality</a:t>
+            </a:r>
+            <a:endParaRPr lang="" altLang="en-US" sz="2160">
+              <a:solidFill>
+                <a:schemeClr val="bg1"/>
+              </a:solidFill>
+              <a:sym typeface="+mn-ea"/>
+            </a:endParaRPr>
+          </a:p>
+          <a:p>
+            <a:pPr lvl="0"/>
+            <a:endParaRPr lang="" altLang="en-US" sz="2400">
+              <a:solidFill>
+                <a:schemeClr val="bg1"/>
+              </a:solidFill>
+              <a:sym typeface="+mn-ea"/>
+            </a:endParaRPr>
+          </a:p>
+          <a:p>
+            <a:pPr lvl="0"/>
+            <a:r>
+              <a:rPr lang="" altLang="en-US" sz="2400">
+                <a:solidFill>
+                  <a:schemeClr val="bg1"/>
+                </a:solidFill>
+                <a:sym typeface="+mn-ea"/>
+              </a:rPr>
+              <a:t>So ...</a:t>
+            </a:r>
+            <a:endParaRPr lang="" altLang="en-US" sz="2400">
+              <a:solidFill>
+                <a:schemeClr val="bg1"/>
+              </a:solidFill>
+              <a:sym typeface="+mn-ea"/>
+            </a:endParaRPr>
+          </a:p>
+          <a:p>
+            <a:pPr lvl="1"/>
+            <a:r>
+              <a:rPr lang="" altLang="en-US" sz="2160">
+                <a:solidFill>
+                  <a:schemeClr val="bg1"/>
+                </a:solidFill>
+                <a:sym typeface="+mn-ea"/>
+              </a:rPr>
+              <a:t>1 + 1 -&gt; 2 (int)</a:t>
+            </a:r>
+            <a:endParaRPr lang="" altLang="en-US" sz="2160">
+              <a:solidFill>
+                <a:schemeClr val="bg1"/>
+              </a:solidFill>
+              <a:sym typeface="+mn-ea"/>
+            </a:endParaRPr>
+          </a:p>
+          <a:p>
+            <a:pPr lvl="1"/>
+            <a:r>
+              <a:rPr lang="" altLang="en-US" sz="2160">
+                <a:solidFill>
+                  <a:schemeClr val="bg1"/>
+                </a:solidFill>
+                <a:sym typeface="+mn-ea"/>
+              </a:rPr>
+              <a:t>1 + 1. -&gt; 2. (float)</a:t>
+            </a:r>
+            <a:endParaRPr lang="" altLang="en-US" sz="2160">
+              <a:solidFill>
+                <a:schemeClr val="bg1"/>
+              </a:solidFill>
+              <a:sym typeface="+mn-ea"/>
+            </a:endParaRPr>
+          </a:p>
+          <a:p>
+            <a:pPr lvl="1"/>
+            <a:r>
+              <a:rPr lang="" altLang="en-US" sz="2160">
+                <a:solidFill>
+                  <a:schemeClr val="bg1"/>
+                </a:solidFill>
+                <a:sym typeface="+mn-ea"/>
+              </a:rPr>
+              <a:t>True + 1 -&gt; 2 (int)</a:t>
+            </a:r>
+            <a:endParaRPr lang="" altLang="en-US" sz="2160">
+              <a:solidFill>
+                <a:schemeClr val="bg1"/>
+              </a:solidFill>
+              <a:sym typeface="+mn-ea"/>
+            </a:endParaRPr>
+          </a:p>
+          <a:p>
+            <a:pPr lvl="1"/>
+            <a:r>
+              <a:rPr lang="" altLang="en-US" sz="2160">
+                <a:solidFill>
+                  <a:schemeClr val="bg1"/>
+                </a:solidFill>
+                <a:sym typeface="+mn-ea"/>
+              </a:rPr>
+              <a:t>True + 1. -&gt; 2. (float)</a:t>
+            </a:r>
+            <a:endParaRPr lang="" altLang="en-US" sz="2160">
+              <a:solidFill>
+                <a:schemeClr val="bg1"/>
+              </a:solidFill>
+              <a:sym typeface="+mn-ea"/>
+            </a:endParaRPr>
+          </a:p>
+          <a:p>
+            <a:pPr lvl="1"/>
+            <a:r>
+              <a:rPr lang="" altLang="en-US" sz="2160">
+                <a:solidFill>
+                  <a:schemeClr val="bg1"/>
+                </a:solidFill>
+                <a:sym typeface="+mn-ea"/>
+              </a:rPr>
+              <a:t>True + True -&gt; 2 (int)</a:t>
+            </a:r>
+            <a:endParaRPr lang="" altLang="en-US" sz="2160">
+              <a:solidFill>
+                <a:schemeClr val="bg1"/>
+              </a:solidFill>
+              <a:sym typeface="+mn-ea"/>
+            </a:endParaRPr>
+          </a:p>
+        </p:txBody>
+      </p:sp>
+    </p:spTree>
+  </p:cSld>
+  <p:clrMapOvr>
+    <a:masterClrMapping/>
+  </p:clrMapOvr>
+</p:sld>
+</file>
+
+<file path=ppt/slides/slide15.xml><?xml version="1.0" encoding="utf-8"?>
+<p:sld xmlns:a="http://schemas.openxmlformats.org/drawingml/2006/main" xmlns:r="http://schemas.openxmlformats.org/officeDocument/2006/relationships" xmlns:p="http://schemas.openxmlformats.org/presentationml/2006/main">
+  <p:cSld>
+    <p:spTree>
+      <p:nvGrpSpPr>
+        <p:cNvPr id="1" name=""/>
+        <p:cNvGrpSpPr/>
+        <p:nvPr/>
+      </p:nvGrpSpPr>
+      <p:grpSpPr/>
+      <p:sp>
+        <p:nvSpPr>
+          <p:cNvPr id="4" name="Title 3"/>
+          <p:cNvSpPr>
+            <a:spLocks noGrp="1"/>
+          </p:cNvSpPr>
+          <p:nvPr>
+            <p:ph type="title"/>
+          </p:nvPr>
+        </p:nvSpPr>
+        <p:spPr/>
+        <p:txBody>
+          <a:bodyPr/>
+          <a:p>
+            <a:r>
+              <a:rPr lang="" altLang="en-US"/>
+              <a:t>Practicum: Primitives</a:t>
+            </a:r>
+            <a:br>
+              <a:rPr lang="" altLang="en-US"/>
+            </a:br>
+            <a:r>
+              <a:rPr lang="" altLang="en-US" sz="3600"/>
+              <a:t>(Primitives.ipynb)</a:t>
+            </a:r>
+            <a:endParaRPr lang="" altLang="en-US" sz="3600"/>
+          </a:p>
+        </p:txBody>
+      </p:sp>
+    </p:spTree>
+  </p:cSld>
+  <p:clrMapOvr>
+    <a:masterClrMapping/>
+  </p:clrMapOvr>
+</p:sld>
+</file>
+
+<file path=ppt/slides/slide16.xml><?xml version="1.0" encoding="utf-8"?>
+<p:sld xmlns:a="http://schemas.openxmlformats.org/drawingml/2006/main" xmlns:r="http://schemas.openxmlformats.org/officeDocument/2006/relationships" xmlns:p="http://schemas.openxmlformats.org/presentationml/2006/main">
+  <p:cSld>
+    <p:spTree>
+      <p:nvGrpSpPr>
+        <p:cNvPr id="1" name=""/>
+        <p:cNvGrpSpPr/>
+        <p:nvPr/>
+      </p:nvGrpSpPr>
+      <p:grpSpPr/>
+      <p:sp>
+        <p:nvSpPr>
+          <p:cNvPr id="2" name="Title 1"/>
+          <p:cNvSpPr>
+            <a:spLocks noGrp="1"/>
+          </p:cNvSpPr>
+          <p:nvPr>
+            <p:ph type="title"/>
+          </p:nvPr>
+        </p:nvSpPr>
+        <p:spPr/>
+        <p:txBody>
+          <a:bodyPr/>
+          <a:p>
+            <a:r>
+              <a:rPr lang="en-US" altLang="en-US"/>
+              <a:t>Types - </a:t>
+            </a:r>
+            <a:r>
+              <a:rPr lang="" altLang="en-US">
+                <a:solidFill>
+                  <a:srgbClr val="FD0062"/>
+                </a:solidFill>
+                <a:sym typeface="+mn-ea"/>
+              </a:rPr>
+              <a:t>Reference Types</a:t>
+            </a:r>
+            <a:endParaRPr lang="" altLang="en-US">
+              <a:solidFill>
+                <a:srgbClr val="FD0062"/>
+              </a:solidFill>
+              <a:sym typeface="+mn-ea"/>
+            </a:endParaRPr>
+          </a:p>
+        </p:txBody>
+      </p:sp>
+      <p:sp>
+        <p:nvSpPr>
+          <p:cNvPr id="3" name="Content Placeholder 2"/>
+          <p:cNvSpPr>
+            <a:spLocks noGrp="1"/>
+          </p:cNvSpPr>
+          <p:nvPr>
+            <p:ph idx="1"/>
+          </p:nvPr>
+        </p:nvSpPr>
+        <p:spPr>
+          <a:xfrm>
+            <a:off x="167005" y="1122680"/>
+            <a:ext cx="11857355" cy="5490845"/>
+          </a:xfrm>
+        </p:spPr>
+        <p:txBody>
+          <a:bodyPr>
+            <a:normAutofit/>
+          </a:bodyPr>
+          <a:p>
+            <a:r>
+              <a:rPr lang="" altLang="en-US" sz="2400">
+                <a:solidFill>
+                  <a:schemeClr val="bg1"/>
+                </a:solidFill>
+                <a:sym typeface="+mn-ea"/>
+              </a:rPr>
+              <a:t>Value types are directly linked to values stored in memory, reference types are not</a:t>
+            </a:r>
+            <a:endParaRPr lang="" altLang="en-US" sz="2400">
+              <a:solidFill>
+                <a:schemeClr val="bg1"/>
+              </a:solidFill>
+              <a:sym typeface="+mn-ea"/>
+            </a:endParaRPr>
+          </a:p>
+          <a:p>
+            <a:r>
+              <a:rPr lang="" altLang="en-US" sz="2400">
+                <a:solidFill>
+                  <a:schemeClr val="bg1"/>
+                </a:solidFill>
+                <a:sym typeface="+mn-ea"/>
+              </a:rPr>
+              <a:t>Reference types only store addresses to data in memory called </a:t>
+            </a:r>
+            <a:r>
+              <a:rPr lang="" altLang="en-US" sz="2400" b="1" i="1">
+                <a:solidFill>
+                  <a:srgbClr val="F7D97B"/>
+                </a:solidFill>
+                <a:sym typeface="+mn-ea"/>
+              </a:rPr>
+              <a:t>pointers </a:t>
+            </a:r>
+            <a:r>
+              <a:rPr lang="" altLang="en-US" sz="2400">
+                <a:solidFill>
+                  <a:schemeClr val="bg1"/>
+                </a:solidFill>
+                <a:sym typeface="+mn-ea"/>
+              </a:rPr>
+              <a:t>- a primitive is stored at the address</a:t>
+            </a:r>
+            <a:endParaRPr lang="" altLang="en-US" sz="2400" b="1" i="1">
+              <a:solidFill>
+                <a:srgbClr val="F7D97B"/>
+              </a:solidFill>
+              <a:sym typeface="+mn-ea"/>
+            </a:endParaRPr>
+          </a:p>
+          <a:p>
+            <a:r>
+              <a:rPr lang="" altLang="en-US" sz="2400">
+                <a:solidFill>
+                  <a:schemeClr val="bg1"/>
+                </a:solidFill>
+                <a:sym typeface="+mn-ea"/>
+              </a:rPr>
+              <a:t>Multiple </a:t>
+            </a:r>
+            <a:r>
+              <a:rPr lang="" altLang="en-US" sz="2400">
+                <a:solidFill>
+                  <a:srgbClr val="F7D97B"/>
+                </a:solidFill>
+                <a:sym typeface="+mn-ea"/>
+              </a:rPr>
+              <a:t>pointers </a:t>
+            </a:r>
+            <a:r>
+              <a:rPr lang="" altLang="en-US" sz="2400">
+                <a:solidFill>
+                  <a:schemeClr val="bg1"/>
+                </a:solidFill>
+                <a:sym typeface="+mn-ea"/>
+              </a:rPr>
+              <a:t>can point to the same address in memory</a:t>
+            </a:r>
+            <a:endParaRPr lang="" altLang="en-US" sz="2400">
+              <a:solidFill>
+                <a:schemeClr val="bg1"/>
+              </a:solidFill>
+              <a:sym typeface="+mn-ea"/>
+            </a:endParaRPr>
+          </a:p>
+          <a:p>
+            <a:pPr lvl="1"/>
+            <a:r>
+              <a:rPr lang="" altLang="en-US" sz="2000">
+                <a:solidFill>
+                  <a:schemeClr val="bg1"/>
+                </a:solidFill>
+                <a:sym typeface="+mn-ea"/>
+              </a:rPr>
+              <a:t>This allows for lower memory usage and faster run-times</a:t>
+            </a:r>
+            <a:endParaRPr lang="" altLang="en-US" sz="1940">
+              <a:solidFill>
+                <a:schemeClr val="bg1"/>
+              </a:solidFill>
+              <a:sym typeface="+mn-ea"/>
+            </a:endParaRPr>
+          </a:p>
+          <a:p>
+            <a:pPr lvl="0"/>
+            <a:endParaRPr lang="en-US" altLang="en-US" sz="2400">
+              <a:solidFill>
+                <a:schemeClr val="bg1"/>
+              </a:solidFill>
+              <a:sym typeface="+mn-ea"/>
+            </a:endParaRPr>
+          </a:p>
+          <a:p>
+            <a:pPr lvl="0"/>
+            <a:r>
+              <a:rPr lang="" altLang="en-US" sz="2400">
+                <a:solidFill>
+                  <a:schemeClr val="bg1"/>
+                </a:solidFill>
+                <a:sym typeface="+mn-ea"/>
+              </a:rPr>
+              <a:t>So ...</a:t>
+            </a:r>
+            <a:endParaRPr lang="" altLang="en-US" sz="2400">
+              <a:solidFill>
+                <a:schemeClr val="bg1"/>
+              </a:solidFill>
+              <a:sym typeface="+mn-ea"/>
+            </a:endParaRPr>
+          </a:p>
+          <a:p>
+            <a:pPr lvl="0"/>
+            <a:endParaRPr lang="" altLang="en-US" sz="2400">
+              <a:solidFill>
+                <a:schemeClr val="bg1"/>
+              </a:solidFill>
+              <a:sym typeface="+mn-ea"/>
+            </a:endParaRPr>
+          </a:p>
+          <a:p>
+            <a:pPr lvl="0"/>
+            <a:r>
+              <a:rPr lang="" altLang="en-US" sz="2400">
+                <a:solidFill>
+                  <a:schemeClr val="bg1"/>
+                </a:solidFill>
+                <a:sym typeface="+mn-ea"/>
+              </a:rPr>
+              <a:t>I can create an int then create a pointer which points to it</a:t>
+            </a:r>
+            <a:endParaRPr lang="" altLang="en-US" sz="2400">
+              <a:solidFill>
+                <a:schemeClr val="bg1"/>
+              </a:solidFill>
+              <a:sym typeface="+mn-ea"/>
+            </a:endParaRPr>
+          </a:p>
+          <a:p>
+            <a:pPr lvl="0"/>
+            <a:r>
+              <a:rPr lang="" altLang="en-US" sz="2160">
+                <a:solidFill>
+                  <a:schemeClr val="bg1"/>
+                </a:solidFill>
+                <a:sym typeface="+mn-ea"/>
+              </a:rPr>
+              <a:t>If either variable is changed then both will be changed!</a:t>
+            </a:r>
+            <a:endParaRPr lang="" altLang="en-US" sz="2160">
+              <a:solidFill>
+                <a:schemeClr val="bg1"/>
+              </a:solidFill>
+              <a:sym typeface="+mn-ea"/>
+            </a:endParaRPr>
+          </a:p>
+        </p:txBody>
+      </p:sp>
+    </p:spTree>
+  </p:cSld>
+  <p:clrMapOvr>
+    <a:masterClrMapping/>
+  </p:clrMapOvr>
+</p:sld>
+</file>
+
+<file path=ppt/slides/slide17.xml><?xml version="1.0" encoding="utf-8"?>
+<p:sld xmlns:a="http://schemas.openxmlformats.org/drawingml/2006/main" xmlns:r="http://schemas.openxmlformats.org/officeDocument/2006/relationships" xmlns:p="http://schemas.openxmlformats.org/presentationml/2006/main">
+  <p:cSld>
+    <p:spTree>
+      <p:nvGrpSpPr>
+        <p:cNvPr id="1" name=""/>
+        <p:cNvGrpSpPr/>
+        <p:nvPr/>
+      </p:nvGrpSpPr>
+      <p:grpSpPr/>
+      <p:sp>
+        <p:nvSpPr>
+          <p:cNvPr id="2" name="Title 1"/>
+          <p:cNvSpPr>
+            <a:spLocks noGrp="1"/>
+          </p:cNvSpPr>
+          <p:nvPr>
+            <p:ph type="title"/>
+          </p:nvPr>
+        </p:nvSpPr>
+        <p:spPr/>
+        <p:txBody>
+          <a:bodyPr/>
+          <a:p>
+            <a:r>
+              <a:rPr lang="en-US" altLang="en-US"/>
+              <a:t>Types -</a:t>
+            </a:r>
+            <a:r>
+              <a:rPr lang="en-US" altLang="en-US">
+                <a:solidFill>
+                  <a:srgbClr val="FD0062"/>
+                </a:solidFill>
+              </a:rPr>
+              <a:t> </a:t>
+            </a:r>
+            <a:r>
+              <a:rPr lang="" altLang="en-US">
+                <a:solidFill>
+                  <a:srgbClr val="FD0062"/>
+                </a:solidFill>
+                <a:sym typeface="+mn-ea"/>
+              </a:rPr>
+              <a:t>Array </a:t>
+            </a:r>
+            <a:r>
+              <a:rPr lang="en-US" altLang="en-US">
+                <a:solidFill>
+                  <a:srgbClr val="FD0062"/>
+                </a:solidFill>
+                <a:sym typeface="+mn-ea"/>
+              </a:rPr>
+              <a:t>Types</a:t>
+            </a:r>
+            <a:endParaRPr lang="en-US" altLang="en-US">
+              <a:solidFill>
+                <a:srgbClr val="FD0062"/>
+              </a:solidFill>
+              <a:sym typeface="+mn-ea"/>
+            </a:endParaRPr>
+          </a:p>
+        </p:txBody>
+      </p:sp>
+      <p:sp>
+        <p:nvSpPr>
+          <p:cNvPr id="3" name="Content Placeholder 2"/>
+          <p:cNvSpPr>
+            <a:spLocks noGrp="1"/>
+          </p:cNvSpPr>
+          <p:nvPr>
+            <p:ph idx="1"/>
+          </p:nvPr>
+        </p:nvSpPr>
+        <p:spPr>
+          <a:xfrm>
+            <a:off x="167005" y="1122680"/>
+            <a:ext cx="11857355" cy="5490845"/>
+          </a:xfrm>
+        </p:spPr>
+        <p:txBody>
+          <a:bodyPr>
+            <a:normAutofit lnSpcReduction="20000"/>
+          </a:bodyPr>
+          <a:p>
+            <a:r>
+              <a:rPr lang="" altLang="en-US" sz="2160">
+                <a:solidFill>
+                  <a:schemeClr val="bg1"/>
+                </a:solidFill>
+                <a:sym typeface="+mn-ea"/>
+              </a:rPr>
+              <a:t>An </a:t>
+            </a:r>
+            <a:r>
+              <a:rPr lang="" altLang="en-US" sz="2160">
+                <a:solidFill>
+                  <a:srgbClr val="FD0062"/>
+                </a:solidFill>
+                <a:sym typeface="+mn-ea"/>
+              </a:rPr>
+              <a:t>array </a:t>
+            </a:r>
+            <a:r>
+              <a:rPr lang="" altLang="en-US" sz="2160">
+                <a:solidFill>
+                  <a:schemeClr val="bg1"/>
+                </a:solidFill>
+                <a:sym typeface="+mn-ea"/>
+              </a:rPr>
+              <a:t>type is a type which holds multiple values in the same variable</a:t>
+            </a:r>
+            <a:endParaRPr lang="" altLang="en-US" sz="2160">
+              <a:solidFill>
+                <a:schemeClr val="bg1"/>
+              </a:solidFill>
+              <a:sym typeface="+mn-ea"/>
+            </a:endParaRPr>
+          </a:p>
+          <a:p>
+            <a:pPr lvl="1"/>
+            <a:r>
+              <a:rPr lang="" altLang="en-US" sz="1940">
+                <a:solidFill>
+                  <a:schemeClr val="bg1"/>
+                </a:solidFill>
+                <a:sym typeface="+mn-ea"/>
+              </a:rPr>
+              <a:t>The reason to use pointers is to enable fast computation with </a:t>
+            </a:r>
+            <a:r>
+              <a:rPr lang="" altLang="en-US" sz="1940">
+                <a:solidFill>
+                  <a:srgbClr val="FD0062"/>
+                </a:solidFill>
+                <a:sym typeface="+mn-ea"/>
+              </a:rPr>
+              <a:t>array </a:t>
+            </a:r>
+            <a:r>
+              <a:rPr lang="" altLang="en-US" sz="1940">
+                <a:solidFill>
+                  <a:schemeClr val="bg1"/>
+                </a:solidFill>
+                <a:sym typeface="+mn-ea"/>
+              </a:rPr>
+              <a:t>types</a:t>
+            </a:r>
+            <a:endParaRPr lang="" altLang="en-US" sz="1940">
+              <a:solidFill>
+                <a:schemeClr val="bg1"/>
+              </a:solidFill>
+              <a:sym typeface="+mn-ea"/>
+            </a:endParaRPr>
+          </a:p>
+          <a:p>
+            <a:pPr lvl="0"/>
+            <a:endParaRPr lang="" altLang="en-US" sz="2155">
+              <a:solidFill>
+                <a:schemeClr val="bg1"/>
+              </a:solidFill>
+              <a:sym typeface="+mn-ea"/>
+            </a:endParaRPr>
+          </a:p>
+          <a:p>
+            <a:pPr lvl="0"/>
+            <a:r>
+              <a:rPr lang="" altLang="en-US" sz="2155">
+                <a:solidFill>
+                  <a:schemeClr val="bg1"/>
+                </a:solidFill>
+                <a:sym typeface="+mn-ea"/>
+              </a:rPr>
+              <a:t>Array types are said to be </a:t>
+            </a:r>
+            <a:r>
+              <a:rPr lang="" altLang="en-US" sz="2155" b="1" i="1">
+                <a:solidFill>
+                  <a:srgbClr val="7CE0D1"/>
+                </a:solidFill>
+                <a:sym typeface="+mn-ea"/>
+              </a:rPr>
+              <a:t>iterable </a:t>
+            </a:r>
+            <a:r>
+              <a:rPr lang="" altLang="en-US" sz="2155">
+                <a:solidFill>
+                  <a:schemeClr val="bg1"/>
+                </a:solidFill>
+                <a:sym typeface="+mn-ea"/>
+              </a:rPr>
+              <a:t>if they contain a method of getting then next value from the current value</a:t>
+            </a:r>
+            <a:endParaRPr lang="" altLang="en-US" sz="2155">
+              <a:solidFill>
+                <a:schemeClr val="bg1"/>
+              </a:solidFill>
+              <a:sym typeface="+mn-ea"/>
+            </a:endParaRPr>
+          </a:p>
+          <a:p>
+            <a:pPr lvl="0"/>
+            <a:endParaRPr lang="" altLang="en-US" sz="2155">
+              <a:solidFill>
+                <a:schemeClr val="bg1"/>
+              </a:solidFill>
+              <a:sym typeface="+mn-ea"/>
+            </a:endParaRPr>
+          </a:p>
+          <a:p>
+            <a:pPr lvl="0"/>
+            <a:r>
+              <a:rPr lang="" altLang="en-US" sz="2155">
+                <a:solidFill>
+                  <a:schemeClr val="bg1"/>
+                </a:solidFill>
+                <a:sym typeface="+mn-ea"/>
+              </a:rPr>
+              <a:t>Python has multiple array types:</a:t>
+            </a:r>
+            <a:endParaRPr lang="" altLang="en-US" sz="2155">
+              <a:solidFill>
+                <a:schemeClr val="bg1"/>
+              </a:solidFill>
+              <a:sym typeface="+mn-ea"/>
+            </a:endParaRPr>
+          </a:p>
+          <a:p>
+            <a:pPr lvl="1"/>
+            <a:r>
+              <a:rPr lang="" altLang="en-US" sz="2000">
+                <a:solidFill>
+                  <a:srgbClr val="7CE0D1"/>
+                </a:solidFill>
+                <a:sym typeface="+mn-ea"/>
+              </a:rPr>
+              <a:t>tuple - iterable type which stores objects with integer indexing but cannot be changed</a:t>
+            </a:r>
+            <a:endParaRPr lang="" altLang="en-US" sz="2000">
+              <a:solidFill>
+                <a:srgbClr val="7CE0D1"/>
+              </a:solidFill>
+              <a:sym typeface="+mn-ea"/>
+            </a:endParaRPr>
+          </a:p>
+          <a:p>
+            <a:pPr lvl="1"/>
+            <a:r>
+              <a:rPr lang="" altLang="en-US" sz="2000">
+                <a:solidFill>
+                  <a:srgbClr val="7CE0D1"/>
+                </a:solidFill>
+                <a:sym typeface="+mn-ea"/>
+              </a:rPr>
+              <a:t>list - </a:t>
+            </a:r>
+            <a:r>
+              <a:rPr lang="en-US" altLang="en-US" sz="2000">
+                <a:solidFill>
+                  <a:srgbClr val="7CE0D1"/>
+                </a:solidFill>
+                <a:sym typeface="+mn-ea"/>
+              </a:rPr>
+              <a:t>iterable type which stores objects with integer indexing </a:t>
+            </a:r>
+            <a:r>
+              <a:rPr lang="" altLang="en-US" sz="2000">
+                <a:solidFill>
+                  <a:srgbClr val="7CE0D1"/>
+                </a:solidFill>
+                <a:sym typeface="+mn-ea"/>
+              </a:rPr>
+              <a:t>and </a:t>
+            </a:r>
+            <a:r>
+              <a:rPr lang="en-US" altLang="en-US" sz="2000">
+                <a:solidFill>
+                  <a:srgbClr val="7CE0D1"/>
+                </a:solidFill>
+                <a:sym typeface="+mn-ea"/>
+              </a:rPr>
+              <a:t>can be changed</a:t>
+            </a:r>
+            <a:endParaRPr lang="" altLang="en-US" sz="2000">
+              <a:solidFill>
+                <a:srgbClr val="7CE0D1"/>
+              </a:solidFill>
+              <a:sym typeface="+mn-ea"/>
+            </a:endParaRPr>
+          </a:p>
+          <a:p>
+            <a:pPr lvl="1"/>
+            <a:r>
+              <a:rPr lang="" altLang="en-US" sz="2000">
+                <a:solidFill>
+                  <a:srgbClr val="7CE0D1"/>
+                </a:solidFill>
+                <a:sym typeface="+mn-ea"/>
+              </a:rPr>
+              <a:t>dict - </a:t>
+            </a:r>
+            <a:r>
+              <a:rPr lang="en-US" altLang="en-US" sz="2000">
+                <a:solidFill>
+                  <a:srgbClr val="7CE0D1"/>
+                </a:solidFill>
+                <a:sym typeface="+mn-ea"/>
+              </a:rPr>
+              <a:t>iterable type which stores objects with </a:t>
+            </a:r>
+            <a:r>
+              <a:rPr lang="" altLang="en-US" sz="2000">
+                <a:solidFill>
+                  <a:srgbClr val="7CE0D1"/>
+                </a:solidFill>
+                <a:sym typeface="+mn-ea"/>
+              </a:rPr>
+              <a:t>object </a:t>
+            </a:r>
+            <a:r>
+              <a:rPr lang="en-US" altLang="en-US" sz="2000">
+                <a:solidFill>
+                  <a:srgbClr val="7CE0D1"/>
+                </a:solidFill>
+                <a:sym typeface="+mn-ea"/>
+              </a:rPr>
+              <a:t>indexing and can be changed</a:t>
+            </a:r>
+            <a:endParaRPr lang="" altLang="en-US" sz="2000">
+              <a:solidFill>
+                <a:schemeClr val="bg1"/>
+              </a:solidFill>
+              <a:sym typeface="+mn-ea"/>
+            </a:endParaRPr>
+          </a:p>
+          <a:p>
+            <a:pPr lvl="1"/>
+            <a:r>
+              <a:rPr lang="" altLang="en-US" sz="2000">
+                <a:solidFill>
+                  <a:srgbClr val="F7D97B"/>
+                </a:solidFill>
+                <a:sym typeface="+mn-ea"/>
+              </a:rPr>
+              <a:t>set - non-iterable type which stores objects and can be changed*</a:t>
+            </a:r>
+            <a:endParaRPr lang="" altLang="en-US" sz="2000">
+              <a:solidFill>
+                <a:schemeClr val="bg1"/>
+              </a:solidFill>
+              <a:sym typeface="+mn-ea"/>
+            </a:endParaRPr>
+          </a:p>
+          <a:p>
+            <a:pPr lvl="1"/>
+            <a:r>
+              <a:rPr lang="" altLang="en-US" sz="2000">
+                <a:solidFill>
+                  <a:srgbClr val="7CE0D1"/>
+                </a:solidFill>
+                <a:sym typeface="+mn-ea"/>
+              </a:rPr>
+              <a:t>str - iterable type which stores ASCII characters and can be changed</a:t>
+            </a:r>
+            <a:endParaRPr lang="" altLang="en-US" sz="2000">
+              <a:solidFill>
+                <a:srgbClr val="7CE0D1"/>
+              </a:solidFill>
+              <a:sym typeface="+mn-ea"/>
+            </a:endParaRPr>
+          </a:p>
+          <a:p>
+            <a:pPr lvl="0"/>
+            <a:endParaRPr lang="" altLang="en-US" sz="2220">
+              <a:solidFill>
+                <a:srgbClr val="7CE0D1"/>
+              </a:solidFill>
+              <a:sym typeface="+mn-ea"/>
+            </a:endParaRPr>
+          </a:p>
+          <a:p>
+            <a:pPr lvl="0"/>
+            <a:r>
+              <a:rPr lang="" altLang="en-US" sz="1400" i="1">
+                <a:solidFill>
+                  <a:schemeClr val="bg1"/>
+                </a:solidFill>
+                <a:sym typeface="+mn-ea"/>
+              </a:rPr>
+              <a:t>*Don’t use sets (basically ever) - they aren’t iterable and they have a very specific role</a:t>
+            </a:r>
+            <a:endParaRPr lang="" altLang="en-US" sz="2385">
+              <a:solidFill>
+                <a:schemeClr val="bg1"/>
+              </a:solidFill>
+              <a:sym typeface="+mn-ea"/>
+            </a:endParaRPr>
+          </a:p>
+          <a:p>
+            <a:pPr marL="0" indent="0">
+              <a:buNone/>
+            </a:pPr>
+            <a:endParaRPr lang="" altLang="en-US" sz="1745">
+              <a:solidFill>
+                <a:schemeClr val="bg1"/>
+              </a:solidFill>
+              <a:sym typeface="+mn-ea"/>
+            </a:endParaRPr>
+          </a:p>
+        </p:txBody>
+      </p:sp>
+    </p:spTree>
+  </p:cSld>
+  <p:clrMapOvr>
+    <a:masterClrMapping/>
+  </p:clrMapOvr>
+</p:sld>
+</file>
+
+<file path=ppt/slides/slide18.xml><?xml version="1.0" encoding="utf-8"?>
+<p:sld xmlns:a="http://schemas.openxmlformats.org/drawingml/2006/main" xmlns:r="http://schemas.openxmlformats.org/officeDocument/2006/relationships" xmlns:p="http://schemas.openxmlformats.org/presentationml/2006/main">
+  <p:cSld>
+    <p:spTree>
+      <p:nvGrpSpPr>
+        <p:cNvPr id="1" name=""/>
+        <p:cNvGrpSpPr/>
+        <p:nvPr/>
+      </p:nvGrpSpPr>
+      <p:grpSpPr/>
+      <p:sp>
+        <p:nvSpPr>
+          <p:cNvPr id="2" name="Title 1"/>
+          <p:cNvSpPr>
+            <a:spLocks noGrp="1"/>
+          </p:cNvSpPr>
+          <p:nvPr>
+            <p:ph type="title"/>
+          </p:nvPr>
+        </p:nvSpPr>
+        <p:spPr/>
+        <p:txBody>
+          <a:bodyPr/>
+          <a:p>
+            <a:r>
+              <a:rPr lang="" altLang="en-US"/>
+              <a:t>Iterables - </a:t>
+            </a:r>
+            <a:r>
+              <a:rPr lang="" altLang="en-US">
+                <a:solidFill>
+                  <a:srgbClr val="FD0062"/>
+                </a:solidFill>
+              </a:rPr>
+              <a:t>Indexing</a:t>
+            </a:r>
+            <a:endParaRPr lang="" altLang="en-US">
+              <a:solidFill>
+                <a:srgbClr val="FD0062"/>
+              </a:solidFill>
+            </a:endParaRPr>
+          </a:p>
+        </p:txBody>
+      </p:sp>
+      <p:sp>
+        <p:nvSpPr>
+          <p:cNvPr id="3" name="Content Placeholder 2"/>
+          <p:cNvSpPr>
+            <a:spLocks noGrp="1"/>
+          </p:cNvSpPr>
+          <p:nvPr>
+            <p:ph idx="1"/>
+          </p:nvPr>
+        </p:nvSpPr>
+        <p:spPr/>
+        <p:txBody>
+          <a:bodyPr/>
+          <a:p>
+            <a:r>
+              <a:rPr lang="" altLang="en-US"/>
+              <a:t>Iterable array types are composed of elements - in order to use the elements within an array one has to call them by index</a:t>
+            </a:r>
+            <a:endParaRPr lang="" altLang="en-US"/>
+          </a:p>
+          <a:p>
+            <a:r>
+              <a:rPr lang="" altLang="en-US"/>
+              <a:t>The indices can be specific or fleible</a:t>
+            </a:r>
+            <a:endParaRPr lang="" altLang="en-US"/>
+          </a:p>
+          <a:p>
+            <a:endParaRPr lang="" altLang="en-US"/>
+          </a:p>
+          <a:p>
+            <a:r>
+              <a:rPr lang="" altLang="en-US"/>
+              <a:t>In Python:</a:t>
+            </a:r>
+            <a:endParaRPr lang="" altLang="en-US"/>
+          </a:p>
+          <a:p>
+            <a:pPr lvl="1"/>
+            <a:r>
+              <a:rPr lang="" altLang="en-US"/>
+              <a:t>lists, str, and tuples are </a:t>
+            </a:r>
+            <a:r>
+              <a:rPr lang="" altLang="en-US">
+                <a:solidFill>
+                  <a:srgbClr val="7CE0D1"/>
+                </a:solidFill>
+              </a:rPr>
+              <a:t>integer indexed</a:t>
+            </a:r>
+            <a:r>
+              <a:rPr lang="" altLang="en-US"/>
+              <a:t> meaning that all indices are integers</a:t>
+            </a:r>
+            <a:endParaRPr lang="" altLang="en-US"/>
+          </a:p>
+          <a:p>
+            <a:pPr lvl="1"/>
+            <a:r>
+              <a:rPr lang="" altLang="en-US"/>
+              <a:t>dicts are </a:t>
+            </a:r>
+            <a:r>
+              <a:rPr lang="" altLang="en-US">
+                <a:solidFill>
+                  <a:srgbClr val="F7D97B"/>
+                </a:solidFill>
+              </a:rPr>
+              <a:t>flexibly indexed</a:t>
+            </a:r>
+            <a:r>
+              <a:rPr lang="" altLang="en-US"/>
+              <a:t> meaning that ints, floats, and strs can be used as indices</a:t>
+            </a:r>
+            <a:endParaRPr lang="" altLang="en-US"/>
+          </a:p>
+          <a:p>
+            <a:pPr lvl="0"/>
+            <a:endParaRPr lang="" altLang="en-US" sz="2000"/>
+          </a:p>
+          <a:p>
+            <a:pPr lvl="0"/>
+            <a:endParaRPr lang="" altLang="en-US"/>
+          </a:p>
+          <a:p>
+            <a:pPr lvl="1"/>
+            <a:endParaRPr lang="" altLang="en-US"/>
+          </a:p>
+          <a:p>
+            <a:endParaRPr lang="" altLang="en-US"/>
+          </a:p>
+          <a:p>
+            <a:endParaRPr lang="" altLang="en-US"/>
+          </a:p>
+        </p:txBody>
+      </p:sp>
+    </p:spTree>
+  </p:cSld>
+  <p:clrMapOvr>
+    <a:masterClrMapping/>
+  </p:clrMapOvr>
+</p:sld>
+</file>
+
+<file path=ppt/slides/slide19.xml><?xml version="1.0" encoding="utf-8"?>
+<p:sld xmlns:a="http://schemas.openxmlformats.org/drawingml/2006/main" xmlns:r="http://schemas.openxmlformats.org/officeDocument/2006/relationships" xmlns:p="http://schemas.openxmlformats.org/presentationml/2006/main">
+  <p:cSld>
+    <p:spTree>
+      <p:nvGrpSpPr>
+        <p:cNvPr id="1" name=""/>
+        <p:cNvGrpSpPr/>
+        <p:nvPr/>
+      </p:nvGrpSpPr>
+      <p:grpSpPr/>
+      <p:sp>
+        <p:nvSpPr>
+          <p:cNvPr id="2" name="Title 1"/>
+          <p:cNvSpPr>
+            <a:spLocks noGrp="1"/>
+          </p:cNvSpPr>
+          <p:nvPr>
+            <p:ph type="title"/>
+          </p:nvPr>
+        </p:nvSpPr>
+        <p:spPr/>
+        <p:txBody>
+          <a:bodyPr/>
+          <a:p>
+            <a:r>
+              <a:rPr lang="en-US" altLang="en-US"/>
+              <a:t>Iterables - </a:t>
+            </a:r>
+            <a:r>
+              <a:rPr lang="" altLang="en-US">
+                <a:solidFill>
+                  <a:srgbClr val="FD0062"/>
+                </a:solidFill>
+              </a:rPr>
+              <a:t>Lists vs. Dicts</a:t>
+            </a:r>
+            <a:endParaRPr lang="" altLang="en-US">
+              <a:solidFill>
+                <a:srgbClr val="FD0062"/>
+              </a:solidFill>
+            </a:endParaRPr>
+          </a:p>
+        </p:txBody>
+      </p:sp>
+      <p:sp>
+        <p:nvSpPr>
+          <p:cNvPr id="3" name="Content Placeholder 2"/>
+          <p:cNvSpPr>
+            <a:spLocks noGrp="1"/>
+          </p:cNvSpPr>
+          <p:nvPr>
+            <p:ph idx="1"/>
+          </p:nvPr>
+        </p:nvSpPr>
+        <p:spPr>
+          <a:xfrm>
+            <a:off x="167005" y="1122680"/>
+            <a:ext cx="11857355" cy="5540375"/>
+          </a:xfrm>
+        </p:spPr>
+        <p:txBody>
+          <a:bodyPr/>
+          <a:p>
+            <a:r>
+              <a:rPr lang="" altLang="en-US"/>
+              <a:t>The two most important iterable types in Python are lists and dicts</a:t>
+            </a:r>
+            <a:endParaRPr lang="" altLang="en-US"/>
+          </a:p>
+          <a:p>
+            <a:r>
+              <a:rPr lang="" altLang="en-US"/>
+              <a:t>Both lists and dicts are changable, iterable pointer arrays</a:t>
+            </a:r>
+            <a:endParaRPr lang="" altLang="en-US"/>
+          </a:p>
+          <a:p>
+            <a:pPr lvl="1"/>
+            <a:r>
+              <a:rPr lang="" altLang="en-US"/>
+              <a:t>Elements of lists and dicts can be of any type including lists and dicts and don’t have to be of a consistent type</a:t>
+            </a:r>
+            <a:endParaRPr lang="" altLang="en-US"/>
+          </a:p>
+          <a:p>
+            <a:pPr lvl="1"/>
+            <a:endParaRPr lang="" altLang="en-US"/>
+          </a:p>
+          <a:p>
+            <a:pPr lvl="2"/>
+            <a:r>
+              <a:rPr lang="" altLang="en-US" sz="1600">
+                <a:solidFill>
+                  <a:srgbClr val="F7D97B"/>
+                </a:solidFill>
+              </a:rPr>
+              <a:t>a = [1, ‘abc’, [2, 4.]] is a valid list containing an int at index 0, a string at index 1, and a list at index 2.</a:t>
+            </a:r>
+            <a:endParaRPr lang="" altLang="en-US" sz="1600">
+              <a:solidFill>
+                <a:srgbClr val="F7D97B"/>
+              </a:solidFill>
+            </a:endParaRPr>
+          </a:p>
+          <a:p>
+            <a:pPr lvl="2"/>
+            <a:r>
+              <a:rPr lang="" altLang="en-US" sz="1600">
+                <a:solidFill>
+                  <a:srgbClr val="F7D97B"/>
+                </a:solidFill>
+              </a:rPr>
+              <a:t>a[1] = ‘abc’, a[1][0] = ‘a’</a:t>
+            </a:r>
+            <a:endParaRPr lang="" altLang="en-US" sz="1600"/>
+          </a:p>
+          <a:p>
+            <a:pPr lvl="2"/>
+            <a:endParaRPr lang="" altLang="en-US" sz="1600"/>
+          </a:p>
+          <a:p>
+            <a:pPr lvl="2"/>
+            <a:r>
+              <a:rPr lang="" altLang="en-US" sz="1600">
+                <a:solidFill>
+                  <a:srgbClr val="7CE0D1"/>
+                </a:solidFill>
+              </a:rPr>
+              <a:t>a = {‘first’:1, 1:‘abc’, 2.:{2:4.}} is a valid dict containing an int at key ‘first’ etc.</a:t>
+            </a:r>
+            <a:endParaRPr lang="" altLang="en-US" sz="1600">
+              <a:solidFill>
+                <a:srgbClr val="7CE0D1"/>
+              </a:solidFill>
+            </a:endParaRPr>
+          </a:p>
+          <a:p>
+            <a:pPr lvl="2"/>
+            <a:r>
+              <a:rPr lang="" altLang="en-US" sz="1600">
+                <a:solidFill>
+                  <a:srgbClr val="7CE0D1"/>
+                </a:solidFill>
+              </a:rPr>
+              <a:t>a[2.] = </a:t>
+            </a:r>
+            <a:r>
+              <a:rPr lang="en-US" altLang="en-US">
+                <a:solidFill>
+                  <a:srgbClr val="7CE0D1"/>
+                </a:solidFill>
+                <a:sym typeface="+mn-ea"/>
+              </a:rPr>
+              <a:t>{2:4.}</a:t>
+            </a:r>
+            <a:r>
+              <a:rPr lang="" altLang="en-US" sz="1600">
+                <a:solidFill>
+                  <a:srgbClr val="7CE0D1"/>
+                </a:solidFill>
+              </a:rPr>
+              <a:t> but a[2] does not exist</a:t>
+            </a:r>
+            <a:endParaRPr lang="" altLang="en-US" sz="1600">
+              <a:solidFill>
+                <a:srgbClr val="7CE0D1"/>
+              </a:solidFill>
+            </a:endParaRPr>
+          </a:p>
+          <a:p>
+            <a:pPr lvl="2"/>
+            <a:r>
+              <a:rPr lang="" altLang="en-US" sz="1600">
+                <a:solidFill>
+                  <a:srgbClr val="7CE0D1"/>
+                </a:solidFill>
+              </a:rPr>
+              <a:t>a[2.][2] = 4.</a:t>
+            </a:r>
+            <a:endParaRPr lang="en-US" altLang="en-US"/>
+          </a:p>
+          <a:p>
+            <a:pPr lvl="0"/>
+            <a:endParaRPr lang="en-US" altLang="en-US" sz="2000"/>
+          </a:p>
+          <a:p>
+            <a:pPr lvl="0"/>
+            <a:r>
+              <a:rPr lang="" altLang="en-US" sz="2000"/>
+              <a:t>A vairable which is inherently sequential should be integer indexed, otherwise flexible indexing is more convenient</a:t>
+            </a:r>
+            <a:endParaRPr lang="en-US" altLang="en-US" sz="2000"/>
+          </a:p>
+          <a:p>
+            <a:pPr lvl="0"/>
+            <a:endParaRPr lang="en-US" altLang="en-US"/>
+          </a:p>
+          <a:p>
+            <a:pPr lvl="1"/>
+            <a:endParaRPr lang="en-US" altLang="en-US"/>
+          </a:p>
+          <a:p>
+            <a:endParaRPr lang="en-US" altLang="en-US"/>
+          </a:p>
+          <a:p>
+            <a:endParaRPr lang="en-US" altLang="en-US"/>
           </a:p>
         </p:txBody>
       </p:sp>
@@ -2637,6 +4593,1437 @@
 </p:sld>
 </file>
 
+<file path=ppt/slides/slide20.xml><?xml version="1.0" encoding="utf-8"?>
+<p:sld xmlns:a="http://schemas.openxmlformats.org/drawingml/2006/main" xmlns:r="http://schemas.openxmlformats.org/officeDocument/2006/relationships" xmlns:p="http://schemas.openxmlformats.org/presentationml/2006/main">
+  <p:cSld>
+    <p:spTree>
+      <p:nvGrpSpPr>
+        <p:cNvPr id="1" name=""/>
+        <p:cNvGrpSpPr/>
+        <p:nvPr/>
+      </p:nvGrpSpPr>
+      <p:grpSpPr/>
+      <p:sp>
+        <p:nvSpPr>
+          <p:cNvPr id="2" name="Title 1"/>
+          <p:cNvSpPr>
+            <a:spLocks noGrp="1"/>
+          </p:cNvSpPr>
+          <p:nvPr>
+            <p:ph type="title"/>
+          </p:nvPr>
+        </p:nvSpPr>
+        <p:spPr/>
+        <p:txBody>
+          <a:bodyPr/>
+          <a:p>
+            <a:r>
+              <a:rPr lang="en-US" altLang="en-US"/>
+              <a:t>Iterables - </a:t>
+            </a:r>
+            <a:r>
+              <a:rPr lang="" altLang="en-US">
+                <a:solidFill>
+                  <a:srgbClr val="FD0062"/>
+                </a:solidFill>
+              </a:rPr>
+              <a:t>Copying</a:t>
+            </a:r>
+            <a:endParaRPr lang="" altLang="en-US">
+              <a:solidFill>
+                <a:srgbClr val="FD0062"/>
+              </a:solidFill>
+            </a:endParaRPr>
+          </a:p>
+        </p:txBody>
+      </p:sp>
+      <p:sp>
+        <p:nvSpPr>
+          <p:cNvPr id="3" name="Content Placeholder 2"/>
+          <p:cNvSpPr>
+            <a:spLocks noGrp="1"/>
+          </p:cNvSpPr>
+          <p:nvPr>
+            <p:ph idx="1"/>
+          </p:nvPr>
+        </p:nvSpPr>
+        <p:spPr>
+          <a:xfrm>
+            <a:off x="167005" y="1122680"/>
+            <a:ext cx="11857355" cy="5540375"/>
+          </a:xfrm>
+        </p:spPr>
+        <p:txBody>
+          <a:bodyPr>
+            <a:normAutofit fontScale="90000" lnSpcReduction="20000"/>
+          </a:bodyPr>
+          <a:p>
+            <a:r>
+              <a:rPr lang="" altLang="en-US" sz="2000"/>
+              <a:t>A really big pain point for new users of Python is dealing with pointers</a:t>
+            </a:r>
+            <a:endParaRPr lang="" altLang="en-US" sz="2000"/>
+          </a:p>
+          <a:p>
+            <a:r>
+              <a:rPr lang="" altLang="en-US" sz="2000"/>
+              <a:t>Lists and dicts only contain pointers, not actual values. When a new array-type object is created by referencing another array-type object then no new value is created, just a </a:t>
+            </a:r>
+            <a:r>
+              <a:rPr lang="" altLang="en-US" sz="2000">
+                <a:solidFill>
+                  <a:srgbClr val="F7D97B"/>
+                </a:solidFill>
+              </a:rPr>
+              <a:t>pointer to a pointer</a:t>
+            </a:r>
+            <a:endParaRPr lang="" altLang="en-US" sz="2000" i="1"/>
+          </a:p>
+          <a:p>
+            <a:endParaRPr lang="" altLang="en-US" sz="2000"/>
+          </a:p>
+          <a:p>
+            <a:r>
+              <a:rPr lang="" altLang="en-US" sz="2000"/>
+              <a:t>For example</a:t>
+            </a:r>
+            <a:endParaRPr lang="" altLang="en-US" sz="2000"/>
+          </a:p>
+          <a:p>
+            <a:pPr lvl="1"/>
+            <a:r>
+              <a:rPr lang="" altLang="en-US" sz="1800"/>
+              <a:t>a = [1]</a:t>
+            </a:r>
+            <a:endParaRPr lang="" altLang="en-US" sz="1800"/>
+          </a:p>
+          <a:p>
+            <a:pPr lvl="1"/>
+            <a:r>
+              <a:rPr lang="" altLang="en-US" sz="1800"/>
+              <a:t>b = a</a:t>
+            </a:r>
+            <a:endParaRPr lang="" altLang="en-US" sz="1800"/>
+          </a:p>
+          <a:p>
+            <a:pPr lvl="1"/>
+            <a:r>
+              <a:rPr lang="" altLang="en-US" sz="1800"/>
+              <a:t>a[0] += 1</a:t>
+            </a:r>
+            <a:endParaRPr lang="" altLang="en-US" sz="1800"/>
+          </a:p>
+          <a:p>
+            <a:pPr lvl="1"/>
+            <a:r>
+              <a:rPr lang="" altLang="en-US" sz="1800" b="1"/>
+              <a:t>b = [2]</a:t>
+            </a:r>
+            <a:endParaRPr lang="" altLang="en-US" sz="1800" b="1"/>
+          </a:p>
+          <a:p>
+            <a:pPr lvl="0"/>
+            <a:endParaRPr lang="" altLang="en-US" sz="2000"/>
+          </a:p>
+          <a:p>
+            <a:pPr lvl="0"/>
+            <a:r>
+              <a:rPr lang="" altLang="en-US" sz="2000"/>
+              <a:t>It is really important to manage this and make sure that you don’t have a bunch of references to the same value</a:t>
+            </a:r>
+            <a:endParaRPr lang="" altLang="en-US" sz="2000"/>
+          </a:p>
+          <a:p>
+            <a:pPr lvl="0"/>
+            <a:r>
+              <a:rPr lang="" altLang="en-US" sz="2000"/>
+              <a:t>Python has a </a:t>
+            </a:r>
+            <a:r>
+              <a:rPr lang="" altLang="en-US" sz="2000">
+                <a:solidFill>
+                  <a:srgbClr val="7CE0D1"/>
+                </a:solidFill>
+              </a:rPr>
+              <a:t>copy </a:t>
+            </a:r>
+            <a:r>
+              <a:rPr lang="" altLang="en-US" sz="2000"/>
+              <a:t>functionality which duplicates an array-type object in memory</a:t>
+            </a:r>
+            <a:endParaRPr lang="" altLang="en-US" sz="2000"/>
+          </a:p>
+          <a:p>
+            <a:pPr lvl="0"/>
+            <a:r>
+              <a:rPr lang="en-US" altLang="en-US" sz="2000">
+                <a:sym typeface="+mn-ea"/>
+              </a:rPr>
+              <a:t>For example</a:t>
+            </a:r>
+            <a:endParaRPr lang="en-US" altLang="en-US" sz="2000"/>
+          </a:p>
+          <a:p>
+            <a:pPr lvl="1"/>
+            <a:r>
+              <a:rPr lang="en-US" altLang="en-US" sz="2000">
+                <a:sym typeface="+mn-ea"/>
+              </a:rPr>
+              <a:t>a = [1]</a:t>
+            </a:r>
+            <a:endParaRPr lang="en-US" altLang="en-US" sz="2000"/>
+          </a:p>
+          <a:p>
+            <a:pPr lvl="1"/>
+            <a:r>
+              <a:rPr lang="en-US" altLang="en-US" sz="2000">
+                <a:sym typeface="+mn-ea"/>
+              </a:rPr>
+              <a:t>b = a</a:t>
+            </a:r>
+            <a:r>
+              <a:rPr lang="" altLang="en-US" sz="2000">
+                <a:sym typeface="+mn-ea"/>
+              </a:rPr>
+              <a:t>.</a:t>
+            </a:r>
+            <a:r>
+              <a:rPr lang="" altLang="en-US" sz="2000">
+                <a:solidFill>
+                  <a:srgbClr val="7CE0D1"/>
+                </a:solidFill>
+                <a:sym typeface="+mn-ea"/>
+              </a:rPr>
+              <a:t>copy</a:t>
+            </a:r>
+            <a:r>
+              <a:rPr lang="" altLang="en-US" sz="2000">
+                <a:sym typeface="+mn-ea"/>
+              </a:rPr>
+              <a:t>()</a:t>
+            </a:r>
+            <a:endParaRPr lang="en-US" altLang="en-US" sz="2000"/>
+          </a:p>
+          <a:p>
+            <a:pPr lvl="1"/>
+            <a:r>
+              <a:rPr lang="en-US" altLang="en-US" sz="2000">
+                <a:sym typeface="+mn-ea"/>
+              </a:rPr>
+              <a:t>a[0] += 1</a:t>
+            </a:r>
+            <a:endParaRPr lang="en-US" altLang="en-US" sz="2000"/>
+          </a:p>
+          <a:p>
+            <a:pPr lvl="1"/>
+            <a:r>
+              <a:rPr lang="en-US" altLang="en-US" sz="2000" b="1">
+                <a:sym typeface="+mn-ea"/>
+              </a:rPr>
+              <a:t>b = [</a:t>
+            </a:r>
+            <a:r>
+              <a:rPr lang="" altLang="en-US" sz="2000" b="1">
+                <a:sym typeface="+mn-ea"/>
+              </a:rPr>
+              <a:t>1</a:t>
+            </a:r>
+            <a:r>
+              <a:rPr lang="en-US" altLang="en-US" sz="2000" b="1">
+                <a:sym typeface="+mn-ea"/>
+              </a:rPr>
+              <a:t>]</a:t>
+            </a:r>
+            <a:endParaRPr lang="en-US" altLang="en-US" sz="2000"/>
+          </a:p>
+          <a:p>
+            <a:pPr lvl="0"/>
+            <a:endParaRPr lang="en-US" altLang="en-US"/>
+          </a:p>
+          <a:p>
+            <a:pPr lvl="1"/>
+            <a:endParaRPr lang="en-US" altLang="en-US"/>
+          </a:p>
+          <a:p>
+            <a:endParaRPr lang="en-US" altLang="en-US"/>
+          </a:p>
+          <a:p>
+            <a:endParaRPr lang="en-US" altLang="en-US"/>
+          </a:p>
+        </p:txBody>
+      </p:sp>
+    </p:spTree>
+  </p:cSld>
+  <p:clrMapOvr>
+    <a:masterClrMapping/>
+  </p:clrMapOvr>
+</p:sld>
+</file>
+
+<file path=ppt/slides/slide21.xml><?xml version="1.0" encoding="utf-8"?>
+<p:sld xmlns:a="http://schemas.openxmlformats.org/drawingml/2006/main" xmlns:r="http://schemas.openxmlformats.org/officeDocument/2006/relationships" xmlns:p="http://schemas.openxmlformats.org/presentationml/2006/main">
+  <p:cSld>
+    <p:spTree>
+      <p:nvGrpSpPr>
+        <p:cNvPr id="1" name=""/>
+        <p:cNvGrpSpPr/>
+        <p:nvPr/>
+      </p:nvGrpSpPr>
+      <p:grpSpPr/>
+      <p:sp>
+        <p:nvSpPr>
+          <p:cNvPr id="4" name="Title 3"/>
+          <p:cNvSpPr>
+            <a:spLocks noGrp="1"/>
+          </p:cNvSpPr>
+          <p:nvPr>
+            <p:ph type="title"/>
+          </p:nvPr>
+        </p:nvSpPr>
+        <p:spPr/>
+        <p:txBody>
+          <a:bodyPr/>
+          <a:p>
+            <a:r>
+              <a:rPr lang="en-US" altLang="en-US"/>
+              <a:t>Practicum: </a:t>
+            </a:r>
+            <a:r>
+              <a:rPr lang="" altLang="en-US"/>
+              <a:t>Iterables</a:t>
+            </a:r>
+            <a:br>
+              <a:rPr lang="" altLang="en-US"/>
+            </a:br>
+            <a:r>
+              <a:rPr lang="" altLang="en-US" sz="3600"/>
+              <a:t>(Iterables.ipynb)</a:t>
+            </a:r>
+            <a:endParaRPr lang="" altLang="en-US" sz="3600"/>
+          </a:p>
+        </p:txBody>
+      </p:sp>
+    </p:spTree>
+  </p:cSld>
+  <p:clrMapOvr>
+    <a:masterClrMapping/>
+  </p:clrMapOvr>
+</p:sld>
+</file>
+
+<file path=ppt/slides/slide22.xml><?xml version="1.0" encoding="utf-8"?>
+<p:sld xmlns:a="http://schemas.openxmlformats.org/drawingml/2006/main" xmlns:r="http://schemas.openxmlformats.org/officeDocument/2006/relationships" xmlns:p="http://schemas.openxmlformats.org/presentationml/2006/main">
+  <p:cSld>
+    <p:spTree>
+      <p:nvGrpSpPr>
+        <p:cNvPr id="1" name=""/>
+        <p:cNvGrpSpPr/>
+        <p:nvPr/>
+      </p:nvGrpSpPr>
+      <p:grpSpPr/>
+      <p:sp>
+        <p:nvSpPr>
+          <p:cNvPr id="4" name="Title 3"/>
+          <p:cNvSpPr>
+            <a:spLocks noGrp="1"/>
+          </p:cNvSpPr>
+          <p:nvPr>
+            <p:ph type="title"/>
+          </p:nvPr>
+        </p:nvSpPr>
+        <p:spPr/>
+        <p:txBody>
+          <a:bodyPr/>
+          <a:p>
+            <a:r>
+              <a:rPr lang="en-US" altLang="en-US"/>
+              <a:t>Section </a:t>
+            </a:r>
+            <a:r>
+              <a:rPr lang="" altLang="en-US"/>
+              <a:t>3</a:t>
+            </a:r>
+            <a:r>
+              <a:rPr lang="en-US" altLang="en-US"/>
+              <a:t>: </a:t>
+            </a:r>
+            <a:r>
+              <a:rPr lang="" altLang="en-US"/>
+              <a:t>Iterators</a:t>
+            </a:r>
+            <a:endParaRPr lang="" altLang="en-US"/>
+          </a:p>
+        </p:txBody>
+      </p:sp>
+    </p:spTree>
+  </p:cSld>
+  <p:clrMapOvr>
+    <a:masterClrMapping/>
+  </p:clrMapOvr>
+</p:sld>
+</file>
+
+<file path=ppt/slides/slide23.xml><?xml version="1.0" encoding="utf-8"?>
+<p:sld xmlns:a="http://schemas.openxmlformats.org/drawingml/2006/main" xmlns:r="http://schemas.openxmlformats.org/officeDocument/2006/relationships" xmlns:p="http://schemas.openxmlformats.org/presentationml/2006/main">
+  <p:cSld>
+    <p:spTree>
+      <p:nvGrpSpPr>
+        <p:cNvPr id="1" name=""/>
+        <p:cNvGrpSpPr/>
+        <p:nvPr/>
+      </p:nvGrpSpPr>
+      <p:grpSpPr/>
+      <p:sp>
+        <p:nvSpPr>
+          <p:cNvPr id="3" name="Title 2"/>
+          <p:cNvSpPr>
+            <a:spLocks noGrp="1"/>
+          </p:cNvSpPr>
+          <p:nvPr>
+            <p:ph type="title"/>
+          </p:nvPr>
+        </p:nvSpPr>
+        <p:spPr/>
+        <p:txBody>
+          <a:bodyPr/>
+          <a:p>
+            <a:r>
+              <a:rPr lang="" altLang="en-US"/>
+              <a:t>Iterators - </a:t>
+            </a:r>
+            <a:r>
+              <a:rPr lang="" altLang="en-US">
+                <a:solidFill>
+                  <a:srgbClr val="FD0062"/>
+                </a:solidFill>
+              </a:rPr>
+              <a:t>Basics</a:t>
+            </a:r>
+            <a:endParaRPr lang="" altLang="en-US">
+              <a:solidFill>
+                <a:srgbClr val="FD0062"/>
+              </a:solidFill>
+            </a:endParaRPr>
+          </a:p>
+        </p:txBody>
+      </p:sp>
+      <p:sp>
+        <p:nvSpPr>
+          <p:cNvPr id="4" name="Content Placeholder 3"/>
+          <p:cNvSpPr>
+            <a:spLocks noGrp="1"/>
+          </p:cNvSpPr>
+          <p:nvPr>
+            <p:ph idx="1"/>
+          </p:nvPr>
+        </p:nvSpPr>
+        <p:spPr/>
+        <p:txBody>
+          <a:bodyPr/>
+          <a:p>
+            <a:r>
+              <a:rPr lang="" altLang="en-US"/>
+              <a:t>If an array type is iterable then it will have an iterator as an attribute</a:t>
+            </a:r>
+            <a:endParaRPr lang="" altLang="en-US"/>
+          </a:p>
+          <a:p>
+            <a:pPr lvl="1"/>
+            <a:r>
+              <a:rPr lang="" altLang="en-US"/>
+              <a:t>In Python this will be called by the attribute </a:t>
+            </a:r>
+            <a:r>
+              <a:rPr lang="" altLang="en-US">
+                <a:solidFill>
+                  <a:srgbClr val="F7D97B"/>
+                </a:solidFill>
+              </a:rPr>
+              <a:t>__iter__</a:t>
+            </a:r>
+            <a:endParaRPr lang="" altLang="en-US">
+              <a:solidFill>
+                <a:srgbClr val="F7D97B"/>
+              </a:solidFill>
+            </a:endParaRPr>
+          </a:p>
+          <a:p>
+            <a:pPr lvl="1"/>
+            <a:r>
+              <a:rPr lang="" altLang="en-US"/>
+              <a:t>Check this by calling hasattr(&lt;obj&gt;, ‘</a:t>
+            </a:r>
+            <a:r>
+              <a:rPr lang="" altLang="en-US">
+                <a:solidFill>
+                  <a:srgbClr val="F7D97B"/>
+                </a:solidFill>
+              </a:rPr>
+              <a:t>__iter__’</a:t>
+            </a:r>
+            <a:r>
+              <a:rPr lang="" altLang="en-US"/>
+              <a:t>)</a:t>
+            </a:r>
+            <a:endParaRPr lang="" altLang="en-US"/>
+          </a:p>
+          <a:p>
+            <a:pPr lvl="0"/>
+            <a:endParaRPr lang="" altLang="en-US"/>
+          </a:p>
+          <a:p>
+            <a:pPr lvl="0"/>
+            <a:r>
+              <a:rPr lang="" altLang="en-US"/>
+              <a:t>At minimum, an iterator will contain a function called </a:t>
+            </a:r>
+            <a:r>
+              <a:rPr lang="" altLang="en-US">
+                <a:solidFill>
+                  <a:srgbClr val="7CE0D1"/>
+                </a:solidFill>
+              </a:rPr>
+              <a:t>__next__</a:t>
+            </a:r>
+            <a:r>
+              <a:rPr lang="" altLang="en-US"/>
+              <a:t> as an attribute which serves the purpose of returning the next item in the array</a:t>
+            </a:r>
+            <a:endParaRPr lang="" altLang="en-US"/>
+          </a:p>
+          <a:p>
+            <a:pPr lvl="0"/>
+            <a:endParaRPr lang="" altLang="en-US"/>
+          </a:p>
+          <a:p>
+            <a:pPr lvl="0"/>
+            <a:r>
+              <a:rPr lang="" altLang="en-US"/>
+              <a:t>Like everything else in Python, these attributes can be overwritten in user defined classes</a:t>
+            </a:r>
+            <a:endParaRPr lang="" altLang="en-US"/>
+          </a:p>
+        </p:txBody>
+      </p:sp>
+    </p:spTree>
+  </p:cSld>
+  <p:clrMapOvr>
+    <a:masterClrMapping/>
+  </p:clrMapOvr>
+</p:sld>
+</file>
+
+<file path=ppt/slides/slide24.xml><?xml version="1.0" encoding="utf-8"?>
+<p:sld xmlns:a="http://schemas.openxmlformats.org/drawingml/2006/main" xmlns:r="http://schemas.openxmlformats.org/officeDocument/2006/relationships" xmlns:p="http://schemas.openxmlformats.org/presentationml/2006/main">
+  <p:cSld>
+    <p:spTree>
+      <p:nvGrpSpPr>
+        <p:cNvPr id="1" name=""/>
+        <p:cNvGrpSpPr/>
+        <p:nvPr/>
+      </p:nvGrpSpPr>
+      <p:grpSpPr/>
+      <p:sp>
+        <p:nvSpPr>
+          <p:cNvPr id="3" name="Title 2"/>
+          <p:cNvSpPr>
+            <a:spLocks noGrp="1"/>
+          </p:cNvSpPr>
+          <p:nvPr>
+            <p:ph type="title"/>
+          </p:nvPr>
+        </p:nvSpPr>
+        <p:spPr/>
+        <p:txBody>
+          <a:bodyPr/>
+          <a:p>
+            <a:r>
+              <a:rPr lang="en-US" altLang="en-US"/>
+              <a:t>Iterators - </a:t>
+            </a:r>
+            <a:r>
+              <a:rPr lang="" altLang="en-US">
+                <a:solidFill>
+                  <a:srgbClr val="FD0062"/>
+                </a:solidFill>
+              </a:rPr>
+              <a:t>Accessing Elements</a:t>
+            </a:r>
+            <a:endParaRPr lang="" altLang="en-US">
+              <a:solidFill>
+                <a:srgbClr val="FD0062"/>
+              </a:solidFill>
+            </a:endParaRPr>
+          </a:p>
+        </p:txBody>
+      </p:sp>
+      <p:sp>
+        <p:nvSpPr>
+          <p:cNvPr id="4" name="Content Placeholder 3"/>
+          <p:cNvSpPr>
+            <a:spLocks noGrp="1"/>
+          </p:cNvSpPr>
+          <p:nvPr>
+            <p:ph idx="1"/>
+          </p:nvPr>
+        </p:nvSpPr>
+        <p:spPr>
+          <a:xfrm>
+            <a:off x="167005" y="1122680"/>
+            <a:ext cx="11857355" cy="5607050"/>
+          </a:xfrm>
+        </p:spPr>
+        <p:txBody>
+          <a:bodyPr>
+            <a:normAutofit lnSpcReduction="20000"/>
+          </a:bodyPr>
+          <a:p>
+            <a:pPr>
+              <a:lnSpc>
+                <a:spcPct val="100000"/>
+              </a:lnSpc>
+            </a:pPr>
+            <a:r>
+              <a:rPr lang="" altLang="en-US"/>
+              <a:t>Iterating through integer-indexed type variables (</a:t>
+            </a:r>
+            <a:r>
+              <a:rPr lang="" altLang="en-US">
+                <a:solidFill>
+                  <a:srgbClr val="7CE0D1"/>
+                </a:solidFill>
+              </a:rPr>
+              <a:t>list</a:t>
+            </a:r>
+            <a:r>
+              <a:rPr lang="" altLang="en-US"/>
+              <a:t>-likes) is straightforward and is mainly done in 3 ways:</a:t>
+            </a:r>
+            <a:endParaRPr lang="" altLang="en-US"/>
+          </a:p>
+          <a:p>
+            <a:pPr lvl="1">
+              <a:lnSpc>
+                <a:spcPct val="100000"/>
+              </a:lnSpc>
+            </a:pPr>
+            <a:r>
+              <a:rPr lang="" altLang="en-US"/>
+              <a:t>for element in </a:t>
+            </a:r>
+            <a:r>
+              <a:rPr lang="" altLang="en-US">
+                <a:solidFill>
+                  <a:srgbClr val="7CE0D1"/>
+                </a:solidFill>
+              </a:rPr>
+              <a:t>list</a:t>
+            </a:r>
+            <a:r>
+              <a:rPr lang="" altLang="en-US"/>
+              <a:t>:</a:t>
+            </a:r>
+            <a:endParaRPr lang="" altLang="en-US"/>
+          </a:p>
+          <a:p>
+            <a:pPr lvl="1">
+              <a:lnSpc>
+                <a:spcPct val="100000"/>
+              </a:lnSpc>
+            </a:pPr>
+            <a:r>
+              <a:rPr lang="" altLang="en-US"/>
+              <a:t>for index in range(len(</a:t>
+            </a:r>
+            <a:r>
+              <a:rPr lang="" altLang="en-US">
+                <a:solidFill>
+                  <a:srgbClr val="7CE0D1"/>
+                </a:solidFill>
+              </a:rPr>
+              <a:t>list</a:t>
+            </a:r>
+            <a:r>
+              <a:rPr lang="" altLang="en-US"/>
+              <a:t>)):</a:t>
+            </a:r>
+            <a:endParaRPr lang="" altLang="en-US"/>
+          </a:p>
+          <a:p>
+            <a:pPr lvl="1">
+              <a:lnSpc>
+                <a:spcPct val="100000"/>
+              </a:lnSpc>
+            </a:pPr>
+            <a:r>
+              <a:rPr lang="" altLang="en-US"/>
+              <a:t>for index, element in enumerate(</a:t>
+            </a:r>
+            <a:r>
+              <a:rPr lang="" altLang="en-US">
+                <a:solidFill>
+                  <a:srgbClr val="7CE0D1"/>
+                </a:solidFill>
+              </a:rPr>
+              <a:t>list</a:t>
+            </a:r>
+            <a:r>
+              <a:rPr lang="" altLang="en-US"/>
+              <a:t>):</a:t>
+            </a:r>
+            <a:endParaRPr lang="" altLang="en-US"/>
+          </a:p>
+          <a:p>
+            <a:pPr lvl="0">
+              <a:lnSpc>
+                <a:spcPct val="100000"/>
+              </a:lnSpc>
+            </a:pPr>
+            <a:endParaRPr lang="" altLang="en-US" sz="2000"/>
+          </a:p>
+          <a:p>
+            <a:pPr lvl="0">
+              <a:lnSpc>
+                <a:spcPct val="100000"/>
+              </a:lnSpc>
+            </a:pPr>
+            <a:r>
+              <a:rPr lang="" altLang="en-US"/>
+              <a:t>Iterating through flexible-indexed type variables (</a:t>
+            </a:r>
+            <a:r>
+              <a:rPr lang="" altLang="en-US">
+                <a:solidFill>
+                  <a:srgbClr val="F7D97B"/>
+                </a:solidFill>
+              </a:rPr>
+              <a:t>dict</a:t>
+            </a:r>
+            <a:r>
+              <a:rPr lang="" altLang="en-US"/>
+              <a:t>-likes) is less straightforward because the indexing is not just increasing integers. Iteration is accomplished using the keys, values, and items attributes</a:t>
+            </a:r>
+            <a:endParaRPr lang="" altLang="en-US"/>
+          </a:p>
+          <a:p>
+            <a:pPr lvl="1">
+              <a:lnSpc>
+                <a:spcPct val="100000"/>
+              </a:lnSpc>
+            </a:pPr>
+            <a:r>
+              <a:rPr lang="" altLang="en-US" sz="1800"/>
+              <a:t>keys() returns the indices as a </a:t>
+            </a:r>
+            <a:r>
+              <a:rPr lang="en-US" altLang="en-US">
+                <a:solidFill>
+                  <a:srgbClr val="F7D97B"/>
+                </a:solidFill>
+                <a:sym typeface="+mn-ea"/>
+              </a:rPr>
+              <a:t>dict</a:t>
+            </a:r>
+            <a:endParaRPr lang="" altLang="en-US" sz="1800"/>
+          </a:p>
+          <a:p>
+            <a:pPr lvl="1">
+              <a:lnSpc>
+                <a:spcPct val="100000"/>
+              </a:lnSpc>
+            </a:pPr>
+            <a:r>
+              <a:rPr lang="" altLang="en-US" sz="1800"/>
+              <a:t>values() returns the values as a </a:t>
+            </a:r>
+            <a:r>
+              <a:rPr lang="en-US" altLang="en-US">
+                <a:solidFill>
+                  <a:srgbClr val="F7D97B"/>
+                </a:solidFill>
+                <a:sym typeface="+mn-ea"/>
+              </a:rPr>
+              <a:t>dict</a:t>
+            </a:r>
+            <a:endParaRPr lang="" altLang="en-US" sz="1800"/>
+          </a:p>
+          <a:p>
+            <a:pPr lvl="1">
+              <a:lnSpc>
+                <a:spcPct val="100000"/>
+              </a:lnSpc>
+            </a:pPr>
+            <a:r>
+              <a:rPr lang="" altLang="en-US" sz="1800"/>
+              <a:t>items() returns both (keys then values)</a:t>
+            </a:r>
+            <a:endParaRPr lang="" altLang="en-US" sz="1800"/>
+          </a:p>
+          <a:p>
+            <a:pPr lvl="1">
+              <a:lnSpc>
+                <a:spcPct val="100000"/>
+              </a:lnSpc>
+            </a:pPr>
+            <a:r>
+              <a:rPr lang="" altLang="en-US" sz="1800"/>
+              <a:t>for key,val in </a:t>
+            </a:r>
+            <a:r>
+              <a:rPr lang="en-US" altLang="en-US">
+                <a:solidFill>
+                  <a:srgbClr val="F7D97B"/>
+                </a:solidFill>
+                <a:sym typeface="+mn-ea"/>
+              </a:rPr>
+              <a:t>dict</a:t>
+            </a:r>
+            <a:r>
+              <a:rPr lang="" altLang="en-US" sz="1800"/>
+              <a:t>.items():</a:t>
+            </a:r>
+            <a:endParaRPr lang="" altLang="en-US" sz="2000"/>
+          </a:p>
+          <a:p>
+            <a:pPr lvl="1"/>
+            <a:endParaRPr lang="" altLang="en-US"/>
+          </a:p>
+          <a:p>
+            <a:pPr lvl="1"/>
+            <a:endParaRPr lang="" altLang="en-US"/>
+          </a:p>
+        </p:txBody>
+      </p:sp>
+    </p:spTree>
+  </p:cSld>
+  <p:clrMapOvr>
+    <a:masterClrMapping/>
+  </p:clrMapOvr>
+</p:sld>
+</file>
+
+<file path=ppt/slides/slide25.xml><?xml version="1.0" encoding="utf-8"?>
+<p:sld xmlns:a="http://schemas.openxmlformats.org/drawingml/2006/main" xmlns:r="http://schemas.openxmlformats.org/officeDocument/2006/relationships" xmlns:p="http://schemas.openxmlformats.org/presentationml/2006/main">
+  <p:cSld>
+    <p:spTree>
+      <p:nvGrpSpPr>
+        <p:cNvPr id="1" name=""/>
+        <p:cNvGrpSpPr/>
+        <p:nvPr/>
+      </p:nvGrpSpPr>
+      <p:grpSpPr/>
+      <p:sp>
+        <p:nvSpPr>
+          <p:cNvPr id="3" name="Title 2"/>
+          <p:cNvSpPr>
+            <a:spLocks noGrp="1"/>
+          </p:cNvSpPr>
+          <p:nvPr>
+            <p:ph type="title"/>
+          </p:nvPr>
+        </p:nvSpPr>
+        <p:spPr/>
+        <p:txBody>
+          <a:bodyPr/>
+          <a:p>
+            <a:r>
+              <a:rPr lang="en-US" altLang="en-US"/>
+              <a:t>Iterators - </a:t>
+            </a:r>
+            <a:r>
+              <a:rPr lang="en-US" altLang="en-US">
+                <a:solidFill>
+                  <a:srgbClr val="FD0062"/>
+                </a:solidFill>
+              </a:rPr>
+              <a:t>Accessing Elements</a:t>
+            </a:r>
+            <a:endParaRPr lang="en-US" altLang="en-US">
+              <a:solidFill>
+                <a:srgbClr val="FD0062"/>
+              </a:solidFill>
+            </a:endParaRPr>
+          </a:p>
+        </p:txBody>
+      </p:sp>
+      <p:sp>
+        <p:nvSpPr>
+          <p:cNvPr id="4" name="Content Placeholder 3"/>
+          <p:cNvSpPr>
+            <a:spLocks noGrp="1"/>
+          </p:cNvSpPr>
+          <p:nvPr>
+            <p:ph idx="1"/>
+          </p:nvPr>
+        </p:nvSpPr>
+        <p:spPr>
+          <a:xfrm>
+            <a:off x="167005" y="1122680"/>
+            <a:ext cx="11857355" cy="5607050"/>
+          </a:xfrm>
+        </p:spPr>
+        <p:txBody>
+          <a:bodyPr>
+            <a:normAutofit/>
+          </a:bodyPr>
+          <a:p>
+            <a:r>
+              <a:rPr lang="en-US" altLang="en-US" sz="2000"/>
+              <a:t>If you want all elements of a list then use the * operator</a:t>
+            </a:r>
+            <a:endParaRPr lang="en-US" altLang="en-US" sz="2000"/>
+          </a:p>
+          <a:p>
+            <a:pPr lvl="1"/>
+            <a:r>
+              <a:rPr lang="en-US" altLang="en-US"/>
+              <a:t>This could be for function calls  - fun(*list)</a:t>
+            </a:r>
+            <a:endParaRPr lang="en-US" altLang="en-US"/>
+          </a:p>
+          <a:p>
+            <a:pPr lvl="1"/>
+            <a:r>
+              <a:rPr lang="en-US" altLang="en-US"/>
+              <a:t>Or for concatenating lists - list_2 = [*list_0, *list_1]</a:t>
+            </a:r>
+            <a:endParaRPr lang="en-US" altLang="en-US"/>
+          </a:p>
+          <a:p>
+            <a:pPr marL="457200" lvl="1" indent="0">
+              <a:buNone/>
+            </a:pPr>
+            <a:endParaRPr lang="en-US" altLang="en-US" sz="2000"/>
+          </a:p>
+          <a:p>
+            <a:pPr lvl="0"/>
+            <a:r>
+              <a:rPr lang="en-US" altLang="en-US" sz="2000"/>
+              <a:t>All dict key-value pairs can be returned using the ** operator</a:t>
+            </a:r>
+            <a:endParaRPr lang="en-US" altLang="en-US" sz="2000"/>
+          </a:p>
+          <a:p>
+            <a:pPr lvl="1"/>
+            <a:r>
+              <a:rPr lang="en-US" altLang="en-US">
+                <a:sym typeface="+mn-ea"/>
+              </a:rPr>
+              <a:t>This could be for function calls  - fun(**dict)</a:t>
+            </a:r>
+            <a:endParaRPr lang="en-US" altLang="en-US"/>
+          </a:p>
+          <a:p>
+            <a:pPr lvl="1"/>
+            <a:r>
+              <a:rPr lang="en-US" altLang="en-US">
+                <a:sym typeface="+mn-ea"/>
+              </a:rPr>
+              <a:t>Or for concatenating dicts - dict _2 = [*dict_0, *dict_1]</a:t>
+            </a:r>
+            <a:endParaRPr lang="en-US" altLang="en-US">
+              <a:sym typeface="+mn-ea"/>
+            </a:endParaRPr>
+          </a:p>
+          <a:p>
+            <a:pPr lvl="0"/>
+            <a:endParaRPr lang="en-US" altLang="en-US" sz="2000">
+              <a:sym typeface="+mn-ea"/>
+            </a:endParaRPr>
+          </a:p>
+          <a:p>
+            <a:pPr lvl="0"/>
+            <a:r>
+              <a:rPr lang="" altLang="en-US" sz="2000">
+                <a:sym typeface="+mn-ea"/>
+              </a:rPr>
+              <a:t>In Python function arguments are structured as fun(*</a:t>
+            </a:r>
+            <a:r>
+              <a:rPr lang="" altLang="en-US" sz="2000">
+                <a:solidFill>
+                  <a:srgbClr val="F7D97B"/>
+                </a:solidFill>
+                <a:sym typeface="+mn-ea"/>
+              </a:rPr>
+              <a:t>args</a:t>
+            </a:r>
+            <a:r>
+              <a:rPr lang="" altLang="en-US" sz="2000">
+                <a:sym typeface="+mn-ea"/>
+              </a:rPr>
+              <a:t>, **</a:t>
+            </a:r>
+            <a:r>
+              <a:rPr lang="" altLang="en-US" sz="2000">
+                <a:solidFill>
+                  <a:srgbClr val="7CE0D1"/>
+                </a:solidFill>
+                <a:sym typeface="+mn-ea"/>
+              </a:rPr>
+              <a:t>kwargs</a:t>
+            </a:r>
+            <a:r>
+              <a:rPr lang="" altLang="en-US" sz="2000">
+                <a:sym typeface="+mn-ea"/>
+              </a:rPr>
+              <a:t>)</a:t>
+            </a:r>
+            <a:endParaRPr lang="" altLang="en-US" sz="2000">
+              <a:sym typeface="+mn-ea"/>
+            </a:endParaRPr>
+          </a:p>
+          <a:p>
+            <a:pPr lvl="1"/>
+            <a:r>
+              <a:rPr lang="" altLang="en-US" sz="1800">
+                <a:sym typeface="+mn-ea"/>
+              </a:rPr>
+              <a:t>args in a list of values to be fed into the function in a pre-defined order</a:t>
+            </a:r>
+            <a:endParaRPr lang="" altLang="en-US" sz="1800">
+              <a:sym typeface="+mn-ea"/>
+            </a:endParaRPr>
+          </a:p>
+          <a:p>
+            <a:pPr lvl="1"/>
+            <a:r>
+              <a:rPr lang="" altLang="en-US" sz="1800">
+                <a:sym typeface="+mn-ea"/>
+              </a:rPr>
+              <a:t>kwargs is a dict of arguments to be inputted after args and must be defined with a default value</a:t>
+            </a:r>
+            <a:endParaRPr lang="" altLang="en-US" sz="1800">
+              <a:sym typeface="+mn-ea"/>
+            </a:endParaRPr>
+          </a:p>
+          <a:p>
+            <a:pPr marL="0" lvl="0" indent="0">
+              <a:buNone/>
+            </a:pPr>
+            <a:endParaRPr lang="" altLang="en-US" sz="2000">
+              <a:sym typeface="+mn-ea"/>
+            </a:endParaRPr>
+          </a:p>
+          <a:p>
+            <a:pPr marL="0" lvl="0" indent="0" algn="ctr">
+              <a:buNone/>
+            </a:pPr>
+            <a:r>
+              <a:rPr lang="" altLang="en-US" sz="2000">
+                <a:sym typeface="+mn-ea"/>
+              </a:rPr>
+              <a:t>fun(</a:t>
+            </a:r>
+            <a:r>
+              <a:rPr lang="" altLang="en-US" sz="2000">
+                <a:solidFill>
+                  <a:srgbClr val="F7D97B"/>
+                </a:solidFill>
+                <a:sym typeface="+mn-ea"/>
+              </a:rPr>
+              <a:t>num_1, num_2,</a:t>
+            </a:r>
+            <a:r>
+              <a:rPr lang="" altLang="en-US" sz="2000">
+                <a:sym typeface="+mn-ea"/>
+              </a:rPr>
+              <a:t> </a:t>
+            </a:r>
+            <a:r>
+              <a:rPr lang="" altLang="en-US" sz="2000">
+                <a:solidFill>
+                  <a:srgbClr val="7CE0D1"/>
+                </a:solidFill>
+                <a:sym typeface="+mn-ea"/>
+              </a:rPr>
+              <a:t>string = ‘the sum is:’</a:t>
+            </a:r>
+            <a:r>
+              <a:rPr lang="" altLang="en-US" sz="2000">
+                <a:sym typeface="+mn-ea"/>
+              </a:rPr>
+              <a:t>):</a:t>
+            </a:r>
+            <a:endParaRPr lang="" altLang="en-US" sz="2000">
+              <a:sym typeface="+mn-ea"/>
+            </a:endParaRPr>
+          </a:p>
+          <a:p>
+            <a:pPr marL="0" lvl="0" indent="0" algn="ctr">
+              <a:buNone/>
+            </a:pPr>
+            <a:r>
+              <a:rPr lang="" altLang="en-US" sz="2000">
+                <a:sym typeface="+mn-ea"/>
+              </a:rPr>
+              <a:t>print(f’{string} {num_1 + num_2}’)</a:t>
+            </a:r>
+            <a:endParaRPr lang="en-US" altLang="en-US" sz="2215"/>
+          </a:p>
+          <a:p>
+            <a:pPr lvl="1"/>
+            <a:endParaRPr lang="en-US" altLang="en-US"/>
+          </a:p>
+          <a:p>
+            <a:pPr lvl="1"/>
+            <a:endParaRPr lang="en-US" altLang="en-US"/>
+          </a:p>
+        </p:txBody>
+      </p:sp>
+    </p:spTree>
+  </p:cSld>
+  <p:clrMapOvr>
+    <a:masterClrMapping/>
+  </p:clrMapOvr>
+</p:sld>
+</file>
+
+<file path=ppt/slides/slide26.xml><?xml version="1.0" encoding="utf-8"?>
+<p:sld xmlns:a="http://schemas.openxmlformats.org/drawingml/2006/main" xmlns:r="http://schemas.openxmlformats.org/officeDocument/2006/relationships" xmlns:p="http://schemas.openxmlformats.org/presentationml/2006/main">
+  <p:cSld>
+    <p:spTree>
+      <p:nvGrpSpPr>
+        <p:cNvPr id="1" name=""/>
+        <p:cNvGrpSpPr/>
+        <p:nvPr/>
+      </p:nvGrpSpPr>
+      <p:grpSpPr/>
+      <p:sp>
+        <p:nvSpPr>
+          <p:cNvPr id="3" name="Title 2"/>
+          <p:cNvSpPr>
+            <a:spLocks noGrp="1"/>
+          </p:cNvSpPr>
+          <p:nvPr>
+            <p:ph type="title"/>
+          </p:nvPr>
+        </p:nvSpPr>
+        <p:spPr/>
+        <p:txBody>
+          <a:bodyPr/>
+          <a:p>
+            <a:r>
+              <a:rPr lang="en-US" altLang="en-US"/>
+              <a:t>Iterators - </a:t>
+            </a:r>
+            <a:r>
+              <a:rPr lang="" altLang="en-US">
+                <a:solidFill>
+                  <a:srgbClr val="FD0062"/>
+                </a:solidFill>
+              </a:rPr>
+              <a:t>Generators</a:t>
+            </a:r>
+            <a:endParaRPr lang="" altLang="en-US">
+              <a:solidFill>
+                <a:srgbClr val="FD0062"/>
+              </a:solidFill>
+            </a:endParaRPr>
+          </a:p>
+        </p:txBody>
+      </p:sp>
+      <p:sp>
+        <p:nvSpPr>
+          <p:cNvPr id="4" name="Content Placeholder 3"/>
+          <p:cNvSpPr>
+            <a:spLocks noGrp="1"/>
+          </p:cNvSpPr>
+          <p:nvPr>
+            <p:ph idx="1"/>
+          </p:nvPr>
+        </p:nvSpPr>
+        <p:spPr/>
+        <p:txBody>
+          <a:bodyPr/>
+          <a:p>
+            <a:r>
+              <a:rPr lang="" altLang="en-US"/>
+              <a:t>In Python for loop logic is handled by </a:t>
+            </a:r>
+            <a:r>
+              <a:rPr lang="" altLang="en-US">
+                <a:solidFill>
+                  <a:srgbClr val="7CE0D1"/>
+                </a:solidFill>
+              </a:rPr>
+              <a:t>generators</a:t>
+            </a:r>
+            <a:endParaRPr lang="" altLang="en-US"/>
+          </a:p>
+          <a:p>
+            <a:pPr lvl="1"/>
+            <a:r>
+              <a:rPr lang="" altLang="en-US"/>
+              <a:t>(</a:t>
+            </a:r>
+            <a:r>
+              <a:rPr lang="" altLang="en-US">
+                <a:solidFill>
+                  <a:srgbClr val="FD0062"/>
+                </a:solidFill>
+              </a:rPr>
+              <a:t>for index, value in enumerate(list)</a:t>
+            </a:r>
+            <a:r>
+              <a:rPr lang="" altLang="en-US"/>
+              <a:t>) is a </a:t>
+            </a:r>
+            <a:r>
+              <a:rPr lang="" altLang="en-US">
+                <a:solidFill>
+                  <a:srgbClr val="7CE0D1"/>
+                </a:solidFill>
+              </a:rPr>
+              <a:t>generator</a:t>
+            </a:r>
+            <a:endParaRPr lang="" altLang="en-US"/>
+          </a:p>
+          <a:p>
+            <a:pPr lvl="1"/>
+            <a:r>
+              <a:rPr lang="" altLang="en-US">
+                <a:solidFill>
+                  <a:srgbClr val="7CE0D1"/>
+                </a:solidFill>
+              </a:rPr>
+              <a:t>generators </a:t>
+            </a:r>
+            <a:r>
+              <a:rPr lang="" altLang="en-US"/>
+              <a:t>are an iterable type with two unique features:</a:t>
+            </a:r>
+            <a:endParaRPr lang="" altLang="en-US"/>
+          </a:p>
+          <a:p>
+            <a:pPr lvl="2"/>
+            <a:r>
+              <a:rPr lang="" altLang="en-US"/>
+              <a:t>They are not index-accesible</a:t>
+            </a:r>
+            <a:endParaRPr lang="" altLang="en-US"/>
+          </a:p>
+          <a:p>
+            <a:pPr lvl="2"/>
+            <a:r>
+              <a:rPr lang="" altLang="en-US"/>
+              <a:t>Elements are deleted after use</a:t>
+            </a:r>
+            <a:endParaRPr lang="" altLang="en-US"/>
+          </a:p>
+          <a:p>
+            <a:pPr lvl="0"/>
+            <a:endParaRPr lang="" altLang="en-US"/>
+          </a:p>
+          <a:p>
+            <a:pPr lvl="0"/>
+            <a:r>
+              <a:rPr lang="" altLang="en-US"/>
+              <a:t>In addition to loop control </a:t>
+            </a:r>
+            <a:r>
+              <a:rPr lang="" altLang="en-US">
+                <a:solidFill>
+                  <a:srgbClr val="7CE0D1"/>
+                </a:solidFill>
+              </a:rPr>
+              <a:t>generators </a:t>
+            </a:r>
+            <a:r>
+              <a:rPr lang="" altLang="en-US"/>
+              <a:t>can be used in a </a:t>
+            </a:r>
+            <a:r>
+              <a:rPr lang="" altLang="en-US" i="1">
+                <a:solidFill>
+                  <a:srgbClr val="F7D97B"/>
+                </a:solidFill>
+              </a:rPr>
+              <a:t>comprehension </a:t>
+            </a:r>
+            <a:r>
+              <a:rPr lang="" altLang="en-US"/>
+              <a:t>where they can procuderally generate an array type object</a:t>
+            </a:r>
+            <a:endParaRPr lang="" altLang="en-US"/>
+          </a:p>
+          <a:p>
+            <a:pPr lvl="1"/>
+            <a:r>
+              <a:rPr lang="" altLang="en-US"/>
+              <a:t>list = [</a:t>
+            </a:r>
+            <a:r>
+              <a:rPr lang="" altLang="en-US">
+                <a:solidFill>
+                  <a:srgbClr val="FD0062"/>
+                </a:solidFill>
+              </a:rPr>
+              <a:t>fun(index) for index in range(n)</a:t>
+            </a:r>
+            <a:r>
+              <a:rPr lang="" altLang="en-US"/>
+              <a:t>]</a:t>
+            </a:r>
+            <a:endParaRPr lang="" altLang="en-US"/>
+          </a:p>
+          <a:p>
+            <a:pPr lvl="1"/>
+            <a:r>
+              <a:rPr lang="" altLang="en-US"/>
+              <a:t>dict = [</a:t>
+            </a:r>
+            <a:r>
+              <a:rPr lang="" altLang="en-US">
+                <a:solidFill>
+                  <a:srgbClr val="FD0062"/>
+                </a:solidFill>
+              </a:rPr>
+              <a:t>index:fun(index) for index in range(n)</a:t>
+            </a:r>
+            <a:r>
+              <a:rPr lang="" altLang="en-US"/>
+              <a:t>]</a:t>
+            </a:r>
+            <a:endParaRPr lang="" altLang="en-US"/>
+          </a:p>
+          <a:p>
+            <a:pPr lvl="0"/>
+            <a:endParaRPr lang="" altLang="en-US"/>
+          </a:p>
+          <a:p>
+            <a:pPr lvl="0"/>
+            <a:r>
+              <a:rPr lang="" altLang="en-US">
+                <a:solidFill>
+                  <a:srgbClr val="7CE0D1"/>
+                </a:solidFill>
+              </a:rPr>
+              <a:t>Generators </a:t>
+            </a:r>
+            <a:r>
+              <a:rPr lang="" altLang="en-US"/>
+              <a:t>can be created, stored, and passed before being used to control a loop or in a comprehension but after they are used - they vanish</a:t>
+            </a:r>
+            <a:endParaRPr lang="" altLang="en-US"/>
+          </a:p>
+          <a:p>
+            <a:pPr lvl="1"/>
+            <a:r>
+              <a:rPr lang="" altLang="en-US"/>
+              <a:t>This is very useful in ways that will be covered later in the course</a:t>
+            </a:r>
+            <a:endParaRPr lang="" altLang="en-US"/>
+          </a:p>
+        </p:txBody>
+      </p:sp>
+    </p:spTree>
+  </p:cSld>
+  <p:clrMapOvr>
+    <a:masterClrMapping/>
+  </p:clrMapOvr>
+</p:sld>
+</file>
+
+<file path=ppt/slides/slide27.xml><?xml version="1.0" encoding="utf-8"?>
+<p:sld xmlns:a="http://schemas.openxmlformats.org/drawingml/2006/main" xmlns:r="http://schemas.openxmlformats.org/officeDocument/2006/relationships" xmlns:p="http://schemas.openxmlformats.org/presentationml/2006/main">
+  <p:cSld>
+    <p:spTree>
+      <p:nvGrpSpPr>
+        <p:cNvPr id="1" name=""/>
+        <p:cNvGrpSpPr/>
+        <p:nvPr/>
+      </p:nvGrpSpPr>
+      <p:grpSpPr/>
+      <p:sp>
+        <p:nvSpPr>
+          <p:cNvPr id="4" name="Title 3"/>
+          <p:cNvSpPr>
+            <a:spLocks noGrp="1"/>
+          </p:cNvSpPr>
+          <p:nvPr>
+            <p:ph type="title"/>
+          </p:nvPr>
+        </p:nvSpPr>
+        <p:spPr/>
+        <p:txBody>
+          <a:bodyPr/>
+          <a:p>
+            <a:r>
+              <a:rPr lang="" altLang="en-US"/>
+              <a:t>Practicum: Iterators</a:t>
+            </a:r>
+            <a:br>
+              <a:rPr lang="" altLang="en-US"/>
+            </a:br>
+            <a:r>
+              <a:rPr lang="" altLang="en-US" sz="3600"/>
+              <a:t>(Iterators.ipynb)</a:t>
+            </a:r>
+            <a:endParaRPr lang="" altLang="en-US" sz="3600"/>
+          </a:p>
+        </p:txBody>
+      </p:sp>
+    </p:spTree>
+  </p:cSld>
+  <p:clrMapOvr>
+    <a:masterClrMapping/>
+  </p:clrMapOvr>
+</p:sld>
+</file>
+
+<file path=ppt/slides/slide28.xml><?xml version="1.0" encoding="utf-8"?>
+<p:sld xmlns:a="http://schemas.openxmlformats.org/drawingml/2006/main" xmlns:r="http://schemas.openxmlformats.org/officeDocument/2006/relationships" xmlns:p="http://schemas.openxmlformats.org/presentationml/2006/main">
+  <p:cSld>
+    <p:spTree>
+      <p:nvGrpSpPr>
+        <p:cNvPr id="1" name=""/>
+        <p:cNvGrpSpPr/>
+        <p:nvPr/>
+      </p:nvGrpSpPr>
+      <p:grpSpPr/>
+      <p:sp>
+        <p:nvSpPr>
+          <p:cNvPr id="4" name="Title 3"/>
+          <p:cNvSpPr>
+            <a:spLocks noGrp="1"/>
+          </p:cNvSpPr>
+          <p:nvPr>
+            <p:ph type="title"/>
+          </p:nvPr>
+        </p:nvSpPr>
+        <p:spPr/>
+        <p:txBody>
+          <a:bodyPr/>
+          <a:p>
+            <a:r>
+              <a:rPr lang="en-US" altLang="en-US"/>
+              <a:t>Section </a:t>
+            </a:r>
+            <a:r>
+              <a:rPr lang="" altLang="en-US"/>
+              <a:t>4</a:t>
+            </a:r>
+            <a:r>
+              <a:rPr lang="en-US" altLang="en-US"/>
+              <a:t>: </a:t>
+            </a:r>
+            <a:r>
+              <a:rPr lang="" altLang="en-US"/>
+              <a:t>Summary</a:t>
+            </a:r>
+            <a:endParaRPr lang="" altLang="en-US"/>
+          </a:p>
+        </p:txBody>
+      </p:sp>
+    </p:spTree>
+  </p:cSld>
+  <p:clrMapOvr>
+    <a:masterClrMapping/>
+  </p:clrMapOvr>
+</p:sld>
+</file>
+
 <file path=ppt/slides/slide3.xml><?xml version="1.0" encoding="utf-8"?>
 <p:sld xmlns:a="http://schemas.openxmlformats.org/drawingml/2006/main" xmlns:r="http://schemas.openxmlformats.org/officeDocument/2006/relationships" xmlns:p="http://schemas.openxmlformats.org/presentationml/2006/main">
   <p:cSld>
@@ -3147,7 +6534,7 @@
           <a:bodyPr/>
           <a:p>
             <a:r>
-              <a:rPr lang="" altLang="en-US"/>
+              <a:rPr lang="en-US" altLang="en-US"/>
               <a:t>Section 1: </a:t>
             </a:r>
             <a:r>
@@ -3156,7 +6543,7 @@
               </a:rPr>
               <a:t>Data Storage</a:t>
             </a:r>
-            <a:endParaRPr lang="" altLang="en-US"/>
+            <a:endParaRPr lang="en-US" altLang="en-US"/>
           </a:p>
         </p:txBody>
       </p:sp>
@@ -3240,47 +6627,47 @@
           </a:bodyPr>
           <a:p>
             <a:r>
-              <a:rPr lang="" altLang="en-US"/>
+              <a:rPr lang="en-US" altLang="en-US"/>
               <a:t>Computers store numbers in binary format using two types of memory:</a:t>
             </a:r>
-            <a:endParaRPr lang="" altLang="en-US"/>
+            <a:endParaRPr lang="en-US" altLang="en-US"/>
           </a:p>
           <a:p>
             <a:pPr marL="800100" lvl="1" indent="-342900">
               <a:buAutoNum type="arabicPeriod"/>
             </a:pPr>
             <a:r>
-              <a:rPr lang="" altLang="en-US">
+              <a:rPr lang="en-US" altLang="en-US">
                 <a:solidFill>
                   <a:srgbClr val="F7D97B"/>
                 </a:solidFill>
               </a:rPr>
               <a:t>Read-Only Memory (ROM)</a:t>
             </a:r>
-            <a:endParaRPr lang="" altLang="en-US"/>
+            <a:endParaRPr lang="en-US" altLang="en-US"/>
           </a:p>
           <a:p>
             <a:pPr marL="800100" lvl="1" indent="-342900">
               <a:buAutoNum type="arabicPeriod"/>
             </a:pPr>
             <a:r>
-              <a:rPr lang="" altLang="en-US">
+              <a:rPr lang="en-US" altLang="en-US">
                 <a:solidFill>
                   <a:srgbClr val="7CE0D1"/>
                 </a:solidFill>
               </a:rPr>
               <a:t>Random Access Memory (RAM)</a:t>
             </a:r>
-            <a:endParaRPr lang="" altLang="en-US"/>
+            <a:endParaRPr lang="en-US" altLang="en-US"/>
           </a:p>
           <a:p>
             <a:pPr lvl="0"/>
             <a:r>
-              <a:rPr lang="" altLang="en-US"/>
+              <a:rPr lang="en-US" altLang="en-US"/>
               <a:t>Physically the main difference is that </a:t>
             </a:r>
             <a:r>
-              <a:rPr lang="" altLang="en-US">
+              <a:rPr lang="en-US" altLang="en-US">
                 <a:solidFill>
                   <a:srgbClr val="F7D97B"/>
                 </a:solidFill>
@@ -3288,11 +6675,11 @@
               <a:t>ROM </a:t>
             </a:r>
             <a:r>
-              <a:rPr lang="" altLang="en-US"/>
+              <a:rPr lang="en-US" altLang="en-US"/>
               <a:t>is stable* meaning that it will retain data if the power is turned off while </a:t>
             </a:r>
             <a:r>
-              <a:rPr lang="" altLang="en-US">
+              <a:rPr lang="en-US" altLang="en-US">
                 <a:solidFill>
                   <a:srgbClr val="7CE0D1"/>
                 </a:solidFill>
@@ -3300,19 +6687,19 @@
               <a:t>RAM </a:t>
             </a:r>
             <a:r>
-              <a:rPr lang="" altLang="en-US"/>
+              <a:rPr lang="en-US" altLang="en-US"/>
               <a:t>is unstable and data will be lost after the power is turend off for a sufficient duration</a:t>
             </a:r>
-            <a:endParaRPr lang="" altLang="en-US"/>
+            <a:endParaRPr lang="en-US" altLang="en-US"/>
           </a:p>
           <a:p>
             <a:pPr lvl="1"/>
             <a:r>
-              <a:rPr lang="" altLang="en-US"/>
+              <a:rPr lang="en-US" altLang="en-US"/>
               <a:t>Generally speaking </a:t>
             </a:r>
             <a:r>
-              <a:rPr lang="" altLang="en-US">
+              <a:rPr lang="en-US" altLang="en-US">
                 <a:solidFill>
                   <a:srgbClr val="7CE0D1"/>
                 </a:solidFill>
@@ -3320,11 +6707,11 @@
               <a:t>RAM </a:t>
             </a:r>
             <a:r>
-              <a:rPr lang="" altLang="en-US"/>
+              <a:rPr lang="en-US" altLang="en-US"/>
               <a:t>has much higher throughput and most of the time processes will load data from </a:t>
             </a:r>
             <a:r>
-              <a:rPr lang="" altLang="en-US">
+              <a:rPr lang="en-US" altLang="en-US">
                 <a:solidFill>
                   <a:srgbClr val="F7D97B"/>
                 </a:solidFill>
@@ -3332,51 +6719,51 @@
               <a:t>ROM </a:t>
             </a:r>
             <a:r>
-              <a:rPr lang="" altLang="en-US"/>
+              <a:rPr lang="en-US" altLang="en-US"/>
               <a:t>to RAM before processing</a:t>
             </a:r>
-            <a:endParaRPr lang="" altLang="en-US"/>
+            <a:endParaRPr lang="en-US" altLang="en-US"/>
           </a:p>
           <a:p>
             <a:pPr lvl="0"/>
-            <a:endParaRPr lang="" altLang="en-US"/>
+            <a:endParaRPr lang="en-US" altLang="en-US"/>
           </a:p>
           <a:p>
             <a:pPr lvl="0"/>
-            <a:endParaRPr lang="" altLang="en-US"/>
+            <a:endParaRPr lang="en-US" altLang="en-US"/>
           </a:p>
           <a:p>
             <a:pPr lvl="0"/>
-            <a:endParaRPr lang="" altLang="en-US"/>
+            <a:endParaRPr lang="en-US" altLang="en-US"/>
           </a:p>
           <a:p>
             <a:pPr lvl="0"/>
-            <a:endParaRPr lang="" altLang="en-US"/>
+            <a:endParaRPr lang="en-US" altLang="en-US"/>
           </a:p>
           <a:p>
             <a:pPr lvl="0"/>
-            <a:endParaRPr lang="" altLang="en-US"/>
+            <a:endParaRPr lang="en-US" altLang="en-US"/>
           </a:p>
           <a:p>
             <a:pPr lvl="0"/>
-            <a:endParaRPr lang="" altLang="en-US"/>
+            <a:endParaRPr lang="en-US" altLang="en-US"/>
           </a:p>
           <a:p>
             <a:pPr marL="0" lvl="0" indent="0">
               <a:buNone/>
             </a:pPr>
-            <a:endParaRPr lang="" altLang="en-US" sz="1600"/>
+            <a:endParaRPr lang="en-US" altLang="en-US" sz="1600"/>
           </a:p>
           <a:p>
             <a:pPr marL="0" lvl="0" indent="0">
               <a:buNone/>
             </a:pPr>
             <a:r>
-              <a:rPr lang="" altLang="en-US" sz="1600"/>
+              <a:rPr lang="en-US" altLang="en-US" sz="1600"/>
               <a:t>*Solid-state </a:t>
             </a:r>
             <a:r>
-              <a:rPr lang="" altLang="en-US" sz="1600">
+              <a:rPr lang="en-US" altLang="en-US" sz="1600">
                 <a:solidFill>
                   <a:srgbClr val="F7D97B"/>
                 </a:solidFill>
@@ -3384,11 +6771,11 @@
               <a:t>ROM </a:t>
             </a:r>
             <a:r>
-              <a:rPr lang="" altLang="en-US" sz="1600"/>
+              <a:rPr lang="en-US" altLang="en-US" sz="1600"/>
               <a:t>is basically </a:t>
             </a:r>
             <a:r>
-              <a:rPr lang="" altLang="en-US" sz="1600">
+              <a:rPr lang="en-US" altLang="en-US" sz="1600">
                 <a:solidFill>
                   <a:srgbClr val="7CE0D1"/>
                 </a:solidFill>
@@ -3396,18 +6783,18 @@
               <a:t>RAM </a:t>
             </a:r>
             <a:r>
-              <a:rPr lang="" altLang="en-US" sz="1600"/>
+              <a:rPr lang="en-US" altLang="en-US" sz="1600"/>
               <a:t>with huge capacitance such that it can take years before data is lost - but it will eventually be lost. SSDs are used because they have high throughput compared to stable </a:t>
             </a:r>
             <a:r>
-              <a:rPr lang="" altLang="en-US" sz="1600">
+              <a:rPr lang="en-US" altLang="en-US" sz="1600">
                 <a:solidFill>
                   <a:srgbClr val="F7D97B"/>
                 </a:solidFill>
               </a:rPr>
               <a:t>ROM</a:t>
             </a:r>
-            <a:endParaRPr lang="" altLang="en-US" sz="1600">
+            <a:endParaRPr lang="en-US" altLang="en-US" sz="1600">
               <a:solidFill>
                 <a:srgbClr val="F7D97B"/>
               </a:solidFill>
@@ -3677,18 +7064,18 @@
           <a:bodyPr/>
           <a:p>
             <a:r>
-              <a:rPr lang="" altLang="en-US"/>
+              <a:rPr lang="en-US" altLang="en-US"/>
               <a:t>Data Storage - </a:t>
             </a:r>
             <a:r>
-              <a:rPr lang="" altLang="en-US">
+              <a:rPr lang="en-US" altLang="en-US">
                 <a:solidFill>
                   <a:srgbClr val="FD0062"/>
                 </a:solidFill>
               </a:rPr>
               <a:t>Addressing</a:t>
             </a:r>
-            <a:endParaRPr lang="" altLang="en-US">
+            <a:endParaRPr lang="en-US" altLang="en-US">
               <a:solidFill>
                 <a:srgbClr val="FD0062"/>
               </a:solidFill>
@@ -3711,47 +7098,47 @@
           <a:bodyPr/>
           <a:p>
             <a:r>
-              <a:rPr lang="" altLang="en-US"/>
+              <a:rPr lang="en-US" altLang="en-US"/>
               <a:t>Data in memory is only useful if it can be retreived</a:t>
             </a:r>
-            <a:endParaRPr lang="" altLang="en-US"/>
+            <a:endParaRPr lang="en-US" altLang="en-US"/>
           </a:p>
           <a:p>
             <a:pPr lvl="1"/>
             <a:r>
-              <a:rPr lang="" altLang="en-US"/>
+              <a:rPr lang="en-US" altLang="en-US"/>
               <a:t>Each memory register has an unique address</a:t>
             </a:r>
-            <a:endParaRPr lang="" altLang="en-US"/>
+            <a:endParaRPr lang="en-US" altLang="en-US"/>
           </a:p>
           <a:p>
             <a:pPr lvl="1"/>
             <a:r>
-              <a:rPr lang="" altLang="en-US"/>
+              <a:rPr lang="en-US" altLang="en-US"/>
               <a:t>Moden computers are generally “byte-accessible”</a:t>
             </a:r>
-            <a:endParaRPr lang="" altLang="en-US"/>
+            <a:endParaRPr lang="en-US" altLang="en-US"/>
           </a:p>
           <a:p>
             <a:pPr lvl="1"/>
             <a:r>
-              <a:rPr lang="" altLang="en-US"/>
+              <a:rPr lang="en-US" altLang="en-US"/>
               <a:t>Data and instructions are sometimes stored together (flat-memory model) and sometimes stored separately (segmented-memory model)</a:t>
             </a:r>
-            <a:endParaRPr lang="" altLang="en-US"/>
+            <a:endParaRPr lang="en-US" altLang="en-US"/>
           </a:p>
           <a:p>
             <a:pPr lvl="1"/>
-            <a:endParaRPr lang="" altLang="en-US"/>
+            <a:endParaRPr lang="en-US" altLang="en-US"/>
           </a:p>
           <a:p>
             <a:pPr lvl="0"/>
             <a:r>
-              <a:rPr lang="" altLang="en-US"/>
+              <a:rPr lang="en-US" altLang="en-US"/>
               <a:t>Physical memory addressing is handled at the </a:t>
             </a:r>
             <a:r>
-              <a:rPr lang="" altLang="en-US">
+              <a:rPr lang="en-US" altLang="en-US">
                 <a:solidFill>
                   <a:srgbClr val="FD0062"/>
                 </a:solidFill>
@@ -3759,11 +7146,11 @@
               <a:t>sub-operating-system level</a:t>
             </a:r>
             <a:r>
-              <a:rPr lang="" altLang="en-US"/>
+              <a:rPr lang="en-US" altLang="en-US"/>
               <a:t> (</a:t>
             </a:r>
             <a:r>
-              <a:rPr lang="" altLang="en-US">
+              <a:rPr lang="en-US" altLang="en-US">
                 <a:solidFill>
                   <a:srgbClr val="F7D97B"/>
                 </a:solidFill>
@@ -3771,18 +7158,18 @@
               <a:t>BIOS </a:t>
             </a:r>
             <a:r>
-              <a:rPr lang="" altLang="en-US"/>
+              <a:rPr lang="en-US" altLang="en-US"/>
               <a:t>and other firmware devices) and is inherently </a:t>
             </a:r>
             <a:r>
-              <a:rPr lang="" altLang="en-US">
+              <a:rPr lang="en-US" altLang="en-US">
                 <a:solidFill>
                   <a:srgbClr val="7CE0D1"/>
                 </a:solidFill>
               </a:rPr>
               <a:t>hardware-specific</a:t>
             </a:r>
-            <a:endParaRPr lang="" altLang="en-US">
+            <a:endParaRPr lang="en-US" altLang="en-US">
               <a:solidFill>
                 <a:srgbClr val="7CE0D1"/>
               </a:solidFill>
@@ -3791,7 +7178,7 @@
           <a:p>
             <a:pPr lvl="1"/>
             <a:r>
-              <a:rPr lang="" altLang="en-US">
+              <a:rPr lang="en-US" altLang="en-US">
                 <a:solidFill>
                   <a:schemeClr val="bg1"/>
                 </a:solidFill>
@@ -3799,7 +7186,7 @@
               <a:t>Memory can be conceived as a table with addresses and values - this is what the </a:t>
             </a:r>
             <a:r>
-              <a:rPr lang="" altLang="en-US">
+              <a:rPr lang="en-US" altLang="en-US">
                 <a:solidFill>
                   <a:srgbClr val="F7D97B"/>
                 </a:solidFill>
@@ -3807,7 +7194,7 @@
               <a:t>BIOS </a:t>
             </a:r>
             <a:r>
-              <a:rPr lang="" altLang="en-US">
+              <a:rPr lang="en-US" altLang="en-US">
                 <a:solidFill>
                   <a:schemeClr val="bg1"/>
                 </a:solidFill>
@@ -3815,7 +7202,7 @@
               <a:t>maintains. All firmware devices (mouse, keyboard, flash memory, etc.) interact with the </a:t>
             </a:r>
             <a:r>
-              <a:rPr lang="" altLang="en-US">
+              <a:rPr lang="en-US" altLang="en-US">
                 <a:solidFill>
                   <a:srgbClr val="F7D97B"/>
                 </a:solidFill>
@@ -3823,14 +7210,14 @@
               <a:t>BIOS </a:t>
             </a:r>
             <a:r>
-              <a:rPr lang="" altLang="en-US">
+              <a:rPr lang="en-US" altLang="en-US">
                 <a:solidFill>
                   <a:schemeClr val="bg1"/>
                 </a:solidFill>
               </a:rPr>
               <a:t>in order to access the memory table.</a:t>
             </a:r>
-            <a:endParaRPr lang="" altLang="en-US">
+            <a:endParaRPr lang="en-US" altLang="en-US">
               <a:solidFill>
                 <a:schemeClr val="bg1"/>
               </a:solidFill>
@@ -4525,18 +7912,18 @@
           <a:bodyPr/>
           <a:p>
             <a:r>
-              <a:rPr lang="" altLang="en-US"/>
+              <a:rPr lang="en-US" altLang="en-US"/>
               <a:t>Data Storage - </a:t>
             </a:r>
             <a:r>
-              <a:rPr lang="" altLang="en-US">
+              <a:rPr lang="en-US" altLang="en-US">
                 <a:solidFill>
                   <a:srgbClr val="FD0062"/>
                 </a:solidFill>
               </a:rPr>
               <a:t>Virtual Addressing</a:t>
             </a:r>
-            <a:endParaRPr lang="" altLang="en-US">
+            <a:endParaRPr lang="en-US" altLang="en-US">
               <a:solidFill>
                 <a:srgbClr val="FD0062"/>
               </a:solidFill>
@@ -4559,11 +7946,11 @@
           <a:bodyPr/>
           <a:p>
             <a:r>
-              <a:rPr lang="" altLang="en-US" sz="1800"/>
+              <a:rPr lang="en-US" altLang="en-US" sz="1800"/>
               <a:t>Fundmentally an </a:t>
             </a:r>
             <a:r>
-              <a:rPr lang="" altLang="en-US" sz="1800">
+              <a:rPr lang="en-US" altLang="en-US" sz="1800">
                 <a:solidFill>
                   <a:srgbClr val="F7D97B"/>
                 </a:solidFill>
@@ -4571,27 +7958,27 @@
               <a:t>Operating System (OS)</a:t>
             </a:r>
             <a:r>
-              <a:rPr lang="" altLang="en-US" sz="1800"/>
+              <a:rPr lang="en-US" altLang="en-US" sz="1800"/>
               <a:t> is an abstraction: a </a:t>
             </a:r>
             <a:r>
-              <a:rPr lang="" altLang="en-US" sz="1800">
+              <a:rPr lang="en-US" altLang="en-US" sz="1800">
                 <a:solidFill>
                   <a:srgbClr val="7CE0D1"/>
                 </a:solidFill>
               </a:rPr>
               <a:t>“program which runs other programs”</a:t>
             </a:r>
-            <a:endParaRPr lang="" altLang="en-US" sz="1800"/>
+            <a:endParaRPr lang="en-US" altLang="en-US" sz="1800"/>
           </a:p>
           <a:p>
             <a:pPr lvl="1"/>
             <a:r>
-              <a:rPr lang="" altLang="en-US" sz="1600"/>
+              <a:rPr lang="en-US" altLang="en-US" sz="1600"/>
               <a:t>In order to accomplish this, the </a:t>
             </a:r>
             <a:r>
-              <a:rPr lang="" altLang="en-US" sz="1600">
+              <a:rPr lang="en-US" altLang="en-US" sz="1600">
                 <a:solidFill>
                   <a:srgbClr val="F7D97B"/>
                 </a:solidFill>
@@ -4599,30 +7986,30 @@
               <a:t>OS </a:t>
             </a:r>
             <a:r>
-              <a:rPr lang="" altLang="en-US" sz="1600"/>
+              <a:rPr lang="en-US" altLang="en-US" sz="1600"/>
               <a:t>cretes a virtual addressing scheme</a:t>
             </a:r>
-            <a:endParaRPr lang="" altLang="en-US" sz="1600"/>
+            <a:endParaRPr lang="en-US" altLang="en-US" sz="1600"/>
           </a:p>
           <a:p>
             <a:pPr lvl="1"/>
             <a:r>
-              <a:rPr lang="" altLang="en-US" sz="1600">
+              <a:rPr lang="en-US" altLang="en-US" sz="1600">
                 <a:solidFill>
                   <a:srgbClr val="FD0062"/>
                 </a:solidFill>
               </a:rPr>
               <a:t>Virtual addressing schema mean that programs which run in a given OS will run no matter what hardware is being used</a:t>
             </a:r>
-            <a:endParaRPr lang="" altLang="en-US" sz="1600"/>
+            <a:endParaRPr lang="en-US" altLang="en-US" sz="1600"/>
           </a:p>
           <a:p>
             <a:pPr lvl="0"/>
             <a:r>
-              <a:rPr lang="" altLang="en-US" sz="1700"/>
+              <a:rPr lang="en-US" altLang="en-US" sz="1700"/>
               <a:t>Virtual addressing works by creating a virtual address table which maps to the physical address table used by the BIOS</a:t>
             </a:r>
-            <a:endParaRPr lang="" altLang="en-US" sz="1700"/>
+            <a:endParaRPr lang="en-US" altLang="en-US" sz="1700"/>
           </a:p>
           <a:p>
             <a:pPr lvl="0"/>
@@ -4647,57 +8034,45 @@
               </a:rPr>
               <a:t>will also provide a file allocation scheme which assigns blocks of memory to files and folders and handles read, write, execute (rwx) permissions</a:t>
             </a:r>
-            <a:endParaRPr lang="" altLang="en-US" sz="1700"/>
+            <a:endParaRPr lang="en-US" altLang="en-US" sz="1700"/>
           </a:p>
           <a:p>
             <a:pPr lvl="0"/>
             <a:r>
-              <a:rPr lang="" altLang="en-US" sz="1700"/>
+              <a:rPr lang="en-US" altLang="en-US" sz="1700"/>
               <a:t>When a high-level language writes data to an address the address is abstracted, </a:t>
             </a:r>
             <a:r>
               <a:rPr lang="en-US" altLang="en-US" sz="1700">
                 <a:sym typeface="+mn-ea"/>
               </a:rPr>
-              <a:t>at least </a:t>
-            </a:r>
-            <a:r>
-              <a:rPr lang="" altLang="en-US" sz="1700">
-                <a:sym typeface="+mn-ea"/>
-              </a:rPr>
-              <a:t>once</a:t>
+              <a:t>at least once, </a:t>
+            </a:r>
+            <a:r>
+              <a:rPr lang="en-US" altLang="en-US" sz="1700"/>
+              <a:t>by the OS virtual addressing scheme and possibly by the translator as well (in Python for example)</a:t>
+            </a:r>
+            <a:endParaRPr lang="en-US" altLang="en-US" sz="1700"/>
+          </a:p>
+          <a:p>
+            <a:pPr lvl="0"/>
+            <a:r>
+              <a:rPr lang="en-US" altLang="en-US" sz="1700"/>
+              <a:t>Any program which uses a virtual addressing scheme, such as CPython, can be described as a </a:t>
             </a:r>
             <a:r>
               <a:rPr lang="en-US" altLang="en-US" sz="1700">
-                <a:sym typeface="+mn-ea"/>
-              </a:rPr>
-              <a:t>, </a:t>
-            </a:r>
-            <a:r>
-              <a:rPr lang="" altLang="en-US" sz="1700"/>
-              <a:t>by the OS virtual addressing scheme and possibly by the translator as well (in Python for example)</a:t>
-            </a:r>
-            <a:endParaRPr lang="" altLang="en-US" sz="1700"/>
+                <a:solidFill>
+                  <a:srgbClr val="FD0062"/>
+                </a:solidFill>
+              </a:rPr>
+              <a:t>“Virtual Machine”</a:t>
+            </a:r>
+            <a:endParaRPr lang="en-US" altLang="en-US" sz="1775"/>
           </a:p>
           <a:p>
             <a:pPr lvl="0"/>
-            <a:r>
-              <a:rPr lang="" altLang="en-US" sz="1700"/>
-              <a:t>Any program which uses a virtual addressing scheme, such as CPython, can be described as a </a:t>
-            </a:r>
-            <a:r>
-              <a:rPr lang="" altLang="en-US" sz="1700">
-                <a:solidFill>
-                  <a:srgbClr val="FD0062"/>
-                </a:solidFill>
-              </a:rPr>
-              <a:t>“Virtual Machine”</a:t>
-            </a:r>
-            <a:endParaRPr lang="" altLang="en-US" sz="1775"/>
-          </a:p>
-          <a:p>
-            <a:pPr lvl="0"/>
-            <a:endParaRPr lang="" altLang="en-US" sz="1600"/>
+            <a:endParaRPr lang="en-US" altLang="en-US" sz="1600"/>
           </a:p>
         </p:txBody>
       </p:sp>
@@ -5388,10 +8763,10 @@
           <a:bodyPr/>
           <a:p>
             <a:r>
-              <a:rPr lang="" altLang="en-US"/>
+              <a:rPr lang="en-US" altLang="en-US"/>
               <a:t>Section 2: Taxonomy</a:t>
             </a:r>
-            <a:endParaRPr lang="" altLang="en-US"/>
+            <a:endParaRPr lang="en-US" altLang="en-US"/>
           </a:p>
         </p:txBody>
       </p:sp>

</xml_diff>